<commit_message>
cont work on slides
</commit_message>
<xml_diff>
--- a/Adv WPF Workshop.pptx
+++ b/Adv WPF Workshop.pptx
@@ -58,31 +58,36 @@
     <p:sldId id="303" r:id="rId52"/>
     <p:sldId id="340" r:id="rId53"/>
     <p:sldId id="305" r:id="rId54"/>
-    <p:sldId id="306" r:id="rId55"/>
-    <p:sldId id="307" r:id="rId56"/>
-    <p:sldId id="309" r:id="rId57"/>
-    <p:sldId id="341" r:id="rId58"/>
-    <p:sldId id="319" r:id="rId59"/>
-    <p:sldId id="318" r:id="rId60"/>
-    <p:sldId id="320" r:id="rId61"/>
-    <p:sldId id="310" r:id="rId62"/>
-    <p:sldId id="342" r:id="rId63"/>
-    <p:sldId id="313" r:id="rId64"/>
-    <p:sldId id="315" r:id="rId65"/>
-    <p:sldId id="317" r:id="rId66"/>
-    <p:sldId id="316" r:id="rId67"/>
-    <p:sldId id="321" r:id="rId68"/>
-    <p:sldId id="322" r:id="rId69"/>
-    <p:sldId id="323" r:id="rId70"/>
-    <p:sldId id="311" r:id="rId71"/>
-    <p:sldId id="324" r:id="rId72"/>
-    <p:sldId id="325" r:id="rId73"/>
-    <p:sldId id="326" r:id="rId74"/>
-    <p:sldId id="327" r:id="rId75"/>
-    <p:sldId id="328" r:id="rId76"/>
-    <p:sldId id="329" r:id="rId77"/>
-    <p:sldId id="330" r:id="rId78"/>
-    <p:sldId id="308" r:id="rId79"/>
+    <p:sldId id="349" r:id="rId55"/>
+    <p:sldId id="306" r:id="rId56"/>
+    <p:sldId id="307" r:id="rId57"/>
+    <p:sldId id="348" r:id="rId58"/>
+    <p:sldId id="309" r:id="rId59"/>
+    <p:sldId id="341" r:id="rId60"/>
+    <p:sldId id="319" r:id="rId61"/>
+    <p:sldId id="318" r:id="rId62"/>
+    <p:sldId id="320" r:id="rId63"/>
+    <p:sldId id="310" r:id="rId64"/>
+    <p:sldId id="342" r:id="rId65"/>
+    <p:sldId id="313" r:id="rId66"/>
+    <p:sldId id="315" r:id="rId67"/>
+    <p:sldId id="344" r:id="rId68"/>
+    <p:sldId id="317" r:id="rId69"/>
+    <p:sldId id="343" r:id="rId70"/>
+    <p:sldId id="345" r:id="rId71"/>
+    <p:sldId id="346" r:id="rId72"/>
+    <p:sldId id="316" r:id="rId73"/>
+    <p:sldId id="321" r:id="rId74"/>
+    <p:sldId id="322" r:id="rId75"/>
+    <p:sldId id="323" r:id="rId76"/>
+    <p:sldId id="324" r:id="rId77"/>
+    <p:sldId id="325" r:id="rId78"/>
+    <p:sldId id="326" r:id="rId79"/>
+    <p:sldId id="327" r:id="rId80"/>
+    <p:sldId id="328" r:id="rId81"/>
+    <p:sldId id="329" r:id="rId82"/>
+    <p:sldId id="330" r:id="rId83"/>
+    <p:sldId id="308" r:id="rId84"/>
   </p:sldIdLst>
   <p:sldSz cx="9144000" cy="6858000" type="screen4x3"/>
   <p:notesSz cx="6858000" cy="9144000"/>
@@ -4568,8 +4573,8 @@
     <dgm:cxn modelId="{61ED3805-547E-4165-890A-7E7A827A370F}" type="presOf" srcId="{5233AE8D-3BCA-4A47-92D4-108A94C094EA}" destId="{28CC0323-E8AB-454E-B9E5-C8BDB7FF0D9E}" srcOrd="0" destOrd="0" presId="urn:microsoft.com/office/officeart/2005/8/layout/hProcess9"/>
     <dgm:cxn modelId="{C43659B9-B11F-464E-B675-F1AFD6DC0E6F}" srcId="{512B78CB-E4DC-4D1C-8D27-AEA9B6B3B334}" destId="{5233AE8D-3BCA-4A47-92D4-108A94C094EA}" srcOrd="4" destOrd="0" parTransId="{8F3EC7E2-BE62-4F98-A49A-C5C4B6ADBB6F}" sibTransId="{3DAAE23E-3384-4B1C-ADE6-E6C444C53E0E}"/>
     <dgm:cxn modelId="{C6F85FAA-35F6-4C69-B1D5-CFA5CF516921}" type="presOf" srcId="{69897640-91C3-4519-8938-17AAAC4C1E3F}" destId="{8F6499CE-E5A6-44D3-8266-88F66EBC4BB2}" srcOrd="0" destOrd="0" presId="urn:microsoft.com/office/officeart/2005/8/layout/hProcess9"/>
+    <dgm:cxn modelId="{FEA4C5B8-5FC4-4430-B0AD-C6C68B7499FC}" type="presOf" srcId="{D1A1224A-2246-4CD8-8E8A-4ACFAF05B2D3}" destId="{6A9196AE-AC7C-476D-8C21-67973FB53462}" srcOrd="0" destOrd="0" presId="urn:microsoft.com/office/officeart/2005/8/layout/hProcess9"/>
     <dgm:cxn modelId="{CD251A95-F804-4F0A-BD53-99BFCADE50D3}" srcId="{512B78CB-E4DC-4D1C-8D27-AEA9B6B3B334}" destId="{D1A1224A-2246-4CD8-8E8A-4ACFAF05B2D3}" srcOrd="1" destOrd="0" parTransId="{25C8157A-39B3-44E4-99CF-CDC276812223}" sibTransId="{EBE1988E-AA4B-45D7-8ADE-9D18B3959943}"/>
-    <dgm:cxn modelId="{FEA4C5B8-5FC4-4430-B0AD-C6C68B7499FC}" type="presOf" srcId="{D1A1224A-2246-4CD8-8E8A-4ACFAF05B2D3}" destId="{6A9196AE-AC7C-476D-8C21-67973FB53462}" srcOrd="0" destOrd="0" presId="urn:microsoft.com/office/officeart/2005/8/layout/hProcess9"/>
     <dgm:cxn modelId="{B27F22A1-DD12-45A7-A2DF-1A146CCB911B}" type="presParOf" srcId="{9372E4EB-2A20-4309-A333-7BDAD49D02C8}" destId="{184443F7-E4B5-422D-B7EC-5A1C3845BF29}" srcOrd="0" destOrd="0" presId="urn:microsoft.com/office/officeart/2005/8/layout/hProcess9"/>
     <dgm:cxn modelId="{05020486-CE38-40FD-AA48-5C04F02514C9}" type="presParOf" srcId="{9372E4EB-2A20-4309-A333-7BDAD49D02C8}" destId="{DEC78D22-7B6B-4EB8-8AAE-3623957CE37F}" srcOrd="1" destOrd="0" presId="urn:microsoft.com/office/officeart/2005/8/layout/hProcess9"/>
     <dgm:cxn modelId="{A075CADA-AE7B-4AE0-92C1-71E15D8BC4BB}" type="presParOf" srcId="{DEC78D22-7B6B-4EB8-8AAE-3623957CE37F}" destId="{0FE174C4-3B78-4A65-B3BC-C8C8AC2D7571}" srcOrd="0" destOrd="0" presId="urn:microsoft.com/office/officeart/2005/8/layout/hProcess9"/>
@@ -23439,77 +23444,47 @@
           <a:lstStyle/>
           <a:p>
             <a:r>
-              <a:rPr lang="en-US" dirty="0" smtClean="0"/>
-              <a:t>Blend</a:t>
-            </a:r>
-            <a:endParaRPr lang="en-US" dirty="0"/>
+              <a:rPr lang="en-US" dirty="0"/>
+              <a:t>Specialists Gap</a:t>
+            </a:r>
           </a:p>
         </p:txBody>
       </p:sp>
-      <p:sp>
-        <p:nvSpPr>
-          <p:cNvPr id="3" name="Content Placeholder 2"/>
-          <p:cNvSpPr>
-            <a:spLocks noGrp="1"/>
-          </p:cNvSpPr>
+      <p:pic>
+        <p:nvPicPr>
+          <p:cNvPr id="4" name="Content Placeholder 3"/>
+          <p:cNvPicPr>
+            <a:picLocks noGrp="1" noChangeAspect="1"/>
+          </p:cNvPicPr>
           <p:nvPr>
             <p:ph idx="1"/>
           </p:nvPr>
-        </p:nvSpPr>
-        <p:spPr/>
-        <p:txBody>
-          <a:bodyPr/>
-          <a:lstStyle/>
-          <a:p>
-            <a:r>
-              <a:rPr lang="en-US" dirty="0" smtClean="0"/>
-              <a:t>No Visual Editor </a:t>
-            </a:r>
-            <a:r>
-              <a:rPr lang="en-US" dirty="0" smtClean="0"/>
-              <a:t>will help (relate to web)</a:t>
-            </a:r>
-          </a:p>
-          <a:p>
-            <a:r>
-              <a:rPr lang="en-US" dirty="0" smtClean="0"/>
-              <a:t>Do web designers use Dreamweaver?</a:t>
-            </a:r>
-          </a:p>
-          <a:p>
-            <a:pPr lvl="1"/>
-            <a:r>
-              <a:rPr lang="en-US" dirty="0" smtClean="0"/>
-              <a:t>“The </a:t>
-            </a:r>
-            <a:r>
-              <a:rPr lang="en-US" dirty="0" smtClean="0"/>
-              <a:t>good ones </a:t>
-            </a:r>
-            <a:r>
-              <a:rPr lang="en-US" dirty="0" smtClean="0"/>
-              <a:t>don’t”</a:t>
-            </a:r>
-            <a:endParaRPr lang="en-US" dirty="0" smtClean="0"/>
-          </a:p>
-          <a:p>
-            <a:r>
-              <a:rPr lang="en-US" dirty="0" smtClean="0"/>
-              <a:t>No editor has adequately solved the problem of </a:t>
-            </a:r>
-            <a:r>
-              <a:rPr lang="en-US" dirty="0" smtClean="0"/>
-              <a:t>converting what the designer sees </a:t>
-            </a:r>
-            <a:r>
-              <a:rPr lang="en-US" dirty="0" smtClean="0"/>
-              <a:t>into meaningful markup</a:t>
-            </a:r>
-            <a:endParaRPr lang="en-US" dirty="0"/>
-          </a:p>
-        </p:txBody>
-      </p:sp>
+        </p:nvPicPr>
+        <p:blipFill>
+          <a:blip r:embed="rId2">
+            <a:extLst>
+              <a:ext uri="{28A0092B-C50C-407E-A947-70E740481C1C}">
+                <a14:useLocalDpi xmlns:a14="http://schemas.microsoft.com/office/drawing/2010/main" val="0"/>
+              </a:ext>
+            </a:extLst>
+          </a:blip>
+          <a:stretch>
+            <a:fillRect/>
+          </a:stretch>
+        </p:blipFill>
+        <p:spPr>
+          <a:xfrm>
+            <a:off x="1934229" y="1371600"/>
+            <a:ext cx="5533371" cy="5062570"/>
+          </a:xfrm>
+        </p:spPr>
+      </p:pic>
     </p:spTree>
+    <p:extLst>
+      <p:ext uri="{BB962C8B-B14F-4D97-AF65-F5344CB8AC3E}">
+        <p14:creationId xmlns:p14="http://schemas.microsoft.com/office/powerpoint/2010/main" val="1083004840"/>
+      </p:ext>
+    </p:extLst>
   </p:cSld>
   <p:clrMapOvr>
     <a:masterClrMapping/>
@@ -23550,8 +23525,8 @@
           <a:lstStyle/>
           <a:p>
             <a:r>
-              <a:rPr lang="en-US" dirty="0" err="1" smtClean="0"/>
-              <a:t>Blendability</a:t>
+              <a:rPr lang="en-US" dirty="0" smtClean="0"/>
+              <a:t>Blend</a:t>
             </a:r>
             <a:endParaRPr lang="en-US" dirty="0"/>
           </a:p>
@@ -23572,30 +23547,28 @@
           <a:bodyPr/>
           <a:lstStyle/>
           <a:p>
-            <a:pPr>
-              <a:buNone/>
-            </a:pPr>
             <a:r>
               <a:rPr lang="en-US" dirty="0" smtClean="0"/>
-              <a:t>“You can’t do that because it doesn’t work in Blend”</a:t>
-            </a:r>
-          </a:p>
-          <a:p>
-            <a:pPr>
-              <a:buNone/>
-            </a:pPr>
-            <a:endParaRPr lang="en-US" dirty="0" smtClean="0"/>
+              <a:t>No Visual Editor will help (relate to web)</a:t>
+            </a:r>
           </a:p>
           <a:p>
             <a:r>
               <a:rPr lang="en-US" dirty="0" smtClean="0"/>
-              <a:t>The ability of a M-V-VM or an application to be open in Blend</a:t>
-            </a:r>
-          </a:p>
-          <a:p>
+              <a:t>Do web designers use Dreamweaver?</a:t>
+            </a:r>
+          </a:p>
+          <a:p>
+            <a:pPr lvl="1"/>
             <a:r>
               <a:rPr lang="en-US" dirty="0" smtClean="0"/>
-              <a:t>Ward Bell : Of Tailors and Tooling</a:t>
+              <a:t>“The good ones don’t”</a:t>
+            </a:r>
+          </a:p>
+          <a:p>
+            <a:r>
+              <a:rPr lang="en-US" dirty="0" smtClean="0"/>
+              <a:t>No editor has adequately solved the problem of converting what the designer sees into meaningful markup</a:t>
             </a:r>
             <a:endParaRPr lang="en-US" dirty="0"/>
           </a:p>
@@ -23642,20 +23615,8 @@
           <a:lstStyle/>
           <a:p>
             <a:r>
-              <a:rPr lang="en-US" dirty="0" smtClean="0"/>
-              <a:t>WPF </a:t>
-            </a:r>
-            <a:r>
               <a:rPr lang="en-US" dirty="0" err="1" smtClean="0"/>
-              <a:t>vs</a:t>
-            </a:r>
-            <a:r>
-              <a:rPr lang="en-US" dirty="0" smtClean="0"/>
-              <a:t> </a:t>
-            </a:r>
-            <a:r>
-              <a:rPr lang="en-US" dirty="0" err="1" smtClean="0"/>
-              <a:t>Winform</a:t>
+              <a:t>Blendability</a:t>
             </a:r>
             <a:endParaRPr lang="en-US" dirty="0"/>
           </a:p>
@@ -23676,28 +23637,392 @@
           <a:bodyPr/>
           <a:lstStyle/>
           <a:p>
+            <a:pPr>
+              <a:buNone/>
+            </a:pPr>
             <a:r>
               <a:rPr lang="en-US" dirty="0" smtClean="0"/>
-              <a:t>Anything you can do I can do better</a:t>
-            </a:r>
+              <a:t>“You can’t do that because it doesn’t work in Blend”</a:t>
+            </a:r>
+          </a:p>
+          <a:p>
+            <a:pPr>
+              <a:buNone/>
+            </a:pPr>
             <a:endParaRPr lang="en-US" dirty="0" smtClean="0"/>
           </a:p>
           <a:p>
             <a:r>
               <a:rPr lang="en-US" dirty="0" smtClean="0"/>
-              <a:t>Reconsider </a:t>
-            </a:r>
+              <a:t>The ability of a M-V-VM or an application to be open in Blend</a:t>
+            </a:r>
+          </a:p>
+          <a:p>
             <a:r>
               <a:rPr lang="en-US" dirty="0" smtClean="0"/>
-              <a:t>old fashioned ideas</a:t>
-            </a:r>
-          </a:p>
+              <a:t>Ward Bell : Of Tailors and Tooling</a:t>
+            </a:r>
+            <a:endParaRPr lang="en-US" dirty="0"/>
+          </a:p>
+        </p:txBody>
+      </p:sp>
+    </p:spTree>
+  </p:cSld>
+  <p:clrMapOvr>
+    <a:masterClrMapping/>
+  </p:clrMapOvr>
+</p:sld>
+</file>
+
+<file path=ppt/slides/slide57.xml><?xml version="1.0" encoding="utf-8"?>
+<p:sld xmlns:a="http://schemas.openxmlformats.org/drawingml/2006/main" xmlns:r="http://schemas.openxmlformats.org/officeDocument/2006/relationships" xmlns:p="http://schemas.openxmlformats.org/presentationml/2006/main">
+  <p:cSld>
+    <p:spTree>
+      <p:nvGrpSpPr>
+        <p:cNvPr id="1" name=""/>
+        <p:cNvGrpSpPr/>
+        <p:nvPr/>
+      </p:nvGrpSpPr>
+      <p:grpSpPr>
+        <a:xfrm>
+          <a:off x="0" y="0"/>
+          <a:ext cx="0" cy="0"/>
+          <a:chOff x="0" y="0"/>
+          <a:chExt cx="0" cy="0"/>
+        </a:xfrm>
+      </p:grpSpPr>
+      <p:sp>
+        <p:nvSpPr>
+          <p:cNvPr id="2" name="Title 1"/>
+          <p:cNvSpPr>
+            <a:spLocks noGrp="1"/>
+          </p:cNvSpPr>
+          <p:nvPr>
+            <p:ph type="title"/>
+          </p:nvPr>
+        </p:nvSpPr>
+        <p:spPr/>
+        <p:txBody>
+          <a:bodyPr/>
+          <a:lstStyle/>
+          <a:p>
+            <a:r>
+              <a:rPr lang="en-US" dirty="0" err="1" smtClean="0"/>
+              <a:t>Devigners</a:t>
+            </a:r>
+            <a:endParaRPr lang="en-US" dirty="0"/>
+          </a:p>
+        </p:txBody>
+      </p:sp>
+      <p:pic>
+        <p:nvPicPr>
+          <p:cNvPr id="4" name="Picture 3"/>
+          <p:cNvPicPr>
+            <a:picLocks noChangeAspect="1"/>
+          </p:cNvPicPr>
+          <p:nvPr/>
+        </p:nvPicPr>
+        <p:blipFill>
+          <a:blip r:embed="rId2">
+            <a:extLst>
+              <a:ext uri="{28A0092B-C50C-407E-A947-70E740481C1C}">
+                <a14:useLocalDpi xmlns:a14="http://schemas.microsoft.com/office/drawing/2010/main" val="0"/>
+              </a:ext>
+            </a:extLst>
+          </a:blip>
+          <a:stretch>
+            <a:fillRect/>
+          </a:stretch>
+        </p:blipFill>
+        <p:spPr>
+          <a:xfrm>
+            <a:off x="1676400" y="1524000"/>
+            <a:ext cx="6131061" cy="4648200"/>
+          </a:xfrm>
+          <a:prstGeom prst="rect">
+            <a:avLst/>
+          </a:prstGeom>
+        </p:spPr>
+      </p:pic>
+      <p:sp>
+        <p:nvSpPr>
+          <p:cNvPr id="5" name="TextBox 4"/>
+          <p:cNvSpPr txBox="1"/>
+          <p:nvPr/>
+        </p:nvSpPr>
+        <p:spPr>
+          <a:xfrm>
+            <a:off x="304800" y="1871990"/>
+            <a:ext cx="2282997" cy="523220"/>
+          </a:xfrm>
+          <a:prstGeom prst="rect">
+            <a:avLst/>
+          </a:prstGeom>
+        </p:spPr>
+        <p:style>
+          <a:lnRef idx="3">
+            <a:schemeClr val="lt1"/>
+          </a:lnRef>
+          <a:fillRef idx="1">
+            <a:schemeClr val="accent1"/>
+          </a:fillRef>
+          <a:effectRef idx="1">
+            <a:schemeClr val="accent1"/>
+          </a:effectRef>
+          <a:fontRef idx="minor">
+            <a:schemeClr val="lt1"/>
+          </a:fontRef>
+        </p:style>
+        <p:txBody>
+          <a:bodyPr wrap="none" rtlCol="0">
+            <a:spAutoFit/>
+          </a:bodyPr>
+          <a:lstStyle/>
+          <a:p>
+            <a:r>
+              <a:rPr lang="en-US" sz="2800" dirty="0" smtClean="0"/>
+              <a:t>See the </a:t>
+            </a:r>
+            <a:r>
+              <a:rPr lang="en-US" sz="2800" dirty="0" err="1" smtClean="0"/>
+              <a:t>xaml</a:t>
+            </a:r>
+            <a:endParaRPr lang="en-US" sz="2800" dirty="0"/>
+          </a:p>
+        </p:txBody>
+      </p:sp>
+      <p:sp>
+        <p:nvSpPr>
+          <p:cNvPr id="6" name="TextBox 5"/>
+          <p:cNvSpPr txBox="1"/>
+          <p:nvPr/>
+        </p:nvSpPr>
+        <p:spPr>
+          <a:xfrm>
+            <a:off x="6629400" y="4419600"/>
+            <a:ext cx="2584362" cy="523220"/>
+          </a:xfrm>
+          <a:prstGeom prst="rect">
+            <a:avLst/>
+          </a:prstGeom>
+        </p:spPr>
+        <p:style>
+          <a:lnRef idx="3">
+            <a:schemeClr val="lt1"/>
+          </a:lnRef>
+          <a:fillRef idx="1">
+            <a:schemeClr val="accent1"/>
+          </a:fillRef>
+          <a:effectRef idx="1">
+            <a:schemeClr val="accent1"/>
+          </a:effectRef>
+          <a:fontRef idx="minor">
+            <a:schemeClr val="lt1"/>
+          </a:fontRef>
+        </p:style>
+        <p:txBody>
+          <a:bodyPr wrap="none" rtlCol="0">
+            <a:spAutoFit/>
+          </a:bodyPr>
+          <a:lstStyle/>
+          <a:p>
+            <a:r>
+              <a:rPr lang="en-US" sz="2800" dirty="0" smtClean="0"/>
+              <a:t>See the design</a:t>
+            </a:r>
+            <a:endParaRPr lang="en-US" sz="2800" dirty="0"/>
+          </a:p>
+        </p:txBody>
+      </p:sp>
+      <p:sp>
+        <p:nvSpPr>
+          <p:cNvPr id="7" name="TextBox 6"/>
+          <p:cNvSpPr txBox="1"/>
+          <p:nvPr/>
+        </p:nvSpPr>
+        <p:spPr>
+          <a:xfrm>
+            <a:off x="3276599" y="2829151"/>
+            <a:ext cx="3185487" cy="646331"/>
+          </a:xfrm>
+          <a:prstGeom prst="rect">
+            <a:avLst/>
+          </a:prstGeom>
+        </p:spPr>
+        <p:style>
+          <a:lnRef idx="3">
+            <a:schemeClr val="lt1"/>
+          </a:lnRef>
+          <a:fillRef idx="1">
+            <a:schemeClr val="accent1"/>
+          </a:fillRef>
+          <a:effectRef idx="1">
+            <a:schemeClr val="accent1"/>
+          </a:effectRef>
+          <a:fontRef idx="minor">
+            <a:schemeClr val="lt1"/>
+          </a:fontRef>
+        </p:style>
+        <p:txBody>
+          <a:bodyPr wrap="none" rtlCol="0">
+            <a:spAutoFit/>
+          </a:bodyPr>
+          <a:lstStyle/>
+          <a:p>
+            <a:r>
+              <a:rPr lang="en-US" sz="3600" dirty="0" smtClean="0"/>
+              <a:t>Bridge the gap</a:t>
+            </a:r>
+            <a:endParaRPr lang="en-US" sz="3600" dirty="0"/>
+          </a:p>
+        </p:txBody>
+      </p:sp>
+      <p:sp>
+        <p:nvSpPr>
+          <p:cNvPr id="9" name="TextBox 8"/>
+          <p:cNvSpPr txBox="1"/>
+          <p:nvPr/>
+        </p:nvSpPr>
+        <p:spPr>
+          <a:xfrm>
+            <a:off x="533400" y="4343400"/>
+            <a:ext cx="5334000" cy="1569660"/>
+          </a:xfrm>
+          <a:prstGeom prst="rect">
+            <a:avLst/>
+          </a:prstGeom>
+        </p:spPr>
+        <p:style>
+          <a:lnRef idx="3">
+            <a:schemeClr val="lt1"/>
+          </a:lnRef>
+          <a:fillRef idx="1">
+            <a:schemeClr val="accent1"/>
+          </a:fillRef>
+          <a:effectRef idx="1">
+            <a:schemeClr val="accent1"/>
+          </a:effectRef>
+          <a:fontRef idx="minor">
+            <a:schemeClr val="lt1"/>
+          </a:fontRef>
+        </p:style>
+        <p:txBody>
+          <a:bodyPr wrap="square" rtlCol="0">
+            <a:spAutoFit/>
+          </a:bodyPr>
+          <a:lstStyle/>
+          <a:p>
+            <a:r>
+              <a:rPr lang="en-US" sz="2400" dirty="0"/>
+              <a:t>Know WPF’s tech capabilities to facilitate creating better UI + design workflow</a:t>
+            </a:r>
+          </a:p>
+          <a:p>
+            <a:endParaRPr lang="en-US" sz="2400" dirty="0"/>
+          </a:p>
+        </p:txBody>
+      </p:sp>
+    </p:spTree>
+    <p:extLst>
+      <p:ext uri="{BB962C8B-B14F-4D97-AF65-F5344CB8AC3E}">
+        <p14:creationId xmlns:p14="http://schemas.microsoft.com/office/powerpoint/2010/main" val="536238960"/>
+      </p:ext>
+    </p:extLst>
+  </p:cSld>
+  <p:clrMapOvr>
+    <a:masterClrMapping/>
+  </p:clrMapOvr>
+</p:sld>
+</file>
+
+<file path=ppt/slides/slide58.xml><?xml version="1.0" encoding="utf-8"?>
+<p:sld xmlns:a="http://schemas.openxmlformats.org/drawingml/2006/main" xmlns:r="http://schemas.openxmlformats.org/officeDocument/2006/relationships" xmlns:p="http://schemas.openxmlformats.org/presentationml/2006/main">
+  <p:cSld>
+    <p:spTree>
+      <p:nvGrpSpPr>
+        <p:cNvPr id="1" name=""/>
+        <p:cNvGrpSpPr/>
+        <p:nvPr/>
+      </p:nvGrpSpPr>
+      <p:grpSpPr>
+        <a:xfrm>
+          <a:off x="0" y="0"/>
+          <a:ext cx="0" cy="0"/>
+          <a:chOff x="0" y="0"/>
+          <a:chExt cx="0" cy="0"/>
+        </a:xfrm>
+      </p:grpSpPr>
+      <p:sp>
+        <p:nvSpPr>
+          <p:cNvPr id="2" name="Title 1"/>
+          <p:cNvSpPr>
+            <a:spLocks noGrp="1"/>
+          </p:cNvSpPr>
+          <p:nvPr>
+            <p:ph type="title"/>
+          </p:nvPr>
+        </p:nvSpPr>
+        <p:spPr/>
+        <p:txBody>
+          <a:bodyPr/>
+          <a:lstStyle/>
           <a:p>
             <a:r>
               <a:rPr lang="en-US" dirty="0" smtClean="0"/>
-              <a:t>Don’t think drag and drop</a:t>
+              <a:t>WPF </a:t>
+            </a:r>
+            <a:r>
+              <a:rPr lang="en-US" dirty="0" err="1" smtClean="0"/>
+              <a:t>vs</a:t>
+            </a:r>
+            <a:r>
+              <a:rPr lang="en-US" dirty="0" smtClean="0"/>
+              <a:t> </a:t>
+            </a:r>
+            <a:r>
+              <a:rPr lang="en-US" dirty="0" err="1" smtClean="0"/>
+              <a:t>Winform</a:t>
             </a:r>
             <a:endParaRPr lang="en-US" dirty="0"/>
+          </a:p>
+        </p:txBody>
+      </p:sp>
+      <p:sp>
+        <p:nvSpPr>
+          <p:cNvPr id="3" name="Content Placeholder 2"/>
+          <p:cNvSpPr>
+            <a:spLocks noGrp="1"/>
+          </p:cNvSpPr>
+          <p:nvPr>
+            <p:ph idx="1"/>
+          </p:nvPr>
+        </p:nvSpPr>
+        <p:spPr>
+          <a:xfrm>
+            <a:off x="1295400" y="2133600"/>
+            <a:ext cx="6705600" cy="762000"/>
+          </a:xfrm>
+        </p:spPr>
+        <p:txBody>
+          <a:bodyPr/>
+          <a:lstStyle/>
+          <a:p>
+            <a:pPr marL="0" indent="0">
+              <a:buNone/>
+            </a:pPr>
+            <a:r>
+              <a:rPr lang="en-US" dirty="0" smtClean="0"/>
+              <a:t>Anything </a:t>
+            </a:r>
+            <a:r>
+              <a:rPr lang="en-US" dirty="0" smtClean="0"/>
+              <a:t>you can do I can do </a:t>
+            </a:r>
+            <a:r>
+              <a:rPr lang="en-US" dirty="0" smtClean="0"/>
+              <a:t>better</a:t>
+            </a:r>
+            <a:endParaRPr lang="en-US" dirty="0" smtClean="0"/>
           </a:p>
         </p:txBody>
       </p:sp>
@@ -23769,7 +24094,7 @@
 </p:sld>
 </file>
 
-<file path=ppt/slides/slide57.xml><?xml version="1.0" encoding="utf-8"?>
+<file path=ppt/slides/slide59.xml><?xml version="1.0" encoding="utf-8"?>
 <p:sld xmlns:a="http://schemas.openxmlformats.org/drawingml/2006/main" xmlns:r="http://schemas.openxmlformats.org/officeDocument/2006/relationships" xmlns:p="http://schemas.openxmlformats.org/presentationml/2006/main">
   <p:cSld>
     <p:spTree>
@@ -23917,161 +24242,6 @@
         <p14:creationId xmlns:p14="http://schemas.microsoft.com/office/powerpoint/2010/main" val="2794339980"/>
       </p:ext>
     </p:extLst>
-  </p:cSld>
-  <p:clrMapOvr>
-    <a:masterClrMapping/>
-  </p:clrMapOvr>
-</p:sld>
-</file>
-
-<file path=ppt/slides/slide58.xml><?xml version="1.0" encoding="utf-8"?>
-<p:sld xmlns:a="http://schemas.openxmlformats.org/drawingml/2006/main" xmlns:r="http://schemas.openxmlformats.org/officeDocument/2006/relationships" xmlns:p="http://schemas.openxmlformats.org/presentationml/2006/main">
-  <p:cSld>
-    <p:spTree>
-      <p:nvGrpSpPr>
-        <p:cNvPr id="1" name=""/>
-        <p:cNvGrpSpPr/>
-        <p:nvPr/>
-      </p:nvGrpSpPr>
-      <p:grpSpPr>
-        <a:xfrm>
-          <a:off x="0" y="0"/>
-          <a:ext cx="0" cy="0"/>
-          <a:chOff x="0" y="0"/>
-          <a:chExt cx="0" cy="0"/>
-        </a:xfrm>
-      </p:grpSpPr>
-      <p:sp>
-        <p:nvSpPr>
-          <p:cNvPr id="2" name="Title 1"/>
-          <p:cNvSpPr>
-            <a:spLocks noGrp="1"/>
-          </p:cNvSpPr>
-          <p:nvPr>
-            <p:ph type="title"/>
-          </p:nvPr>
-        </p:nvSpPr>
-        <p:spPr/>
-        <p:txBody>
-          <a:bodyPr/>
-          <a:lstStyle/>
-          <a:p>
-            <a:r>
-              <a:rPr lang="en-US" dirty="0" smtClean="0"/>
-              <a:t>WPF Truth</a:t>
-            </a:r>
-            <a:endParaRPr lang="en-US" dirty="0"/>
-          </a:p>
-        </p:txBody>
-      </p:sp>
-      <p:graphicFrame>
-        <p:nvGraphicFramePr>
-          <p:cNvPr id="4" name="Diagram 3"/>
-          <p:cNvGraphicFramePr/>
-          <p:nvPr/>
-        </p:nvGraphicFramePr>
-        <p:xfrm>
-          <a:off x="1524000" y="1397000"/>
-          <a:ext cx="6096000" cy="4064000"/>
-        </p:xfrm>
-        <a:graphic>
-          <a:graphicData uri="http://schemas.openxmlformats.org/drawingml/2006/diagram">
-            <dgm:relIds xmlns:dgm="http://schemas.openxmlformats.org/drawingml/2006/diagram" xmlns:r="http://schemas.openxmlformats.org/officeDocument/2006/relationships" r:dm="rId2" r:lo="rId3" r:qs="rId4" r:cs="rId5"/>
-          </a:graphicData>
-        </a:graphic>
-      </p:graphicFrame>
-    </p:spTree>
-  </p:cSld>
-  <p:clrMapOvr>
-    <a:masterClrMapping/>
-  </p:clrMapOvr>
-</p:sld>
-</file>
-
-<file path=ppt/slides/slide59.xml><?xml version="1.0" encoding="utf-8"?>
-<p:sld xmlns:a="http://schemas.openxmlformats.org/drawingml/2006/main" xmlns:r="http://schemas.openxmlformats.org/officeDocument/2006/relationships" xmlns:p="http://schemas.openxmlformats.org/presentationml/2006/main">
-  <p:cSld>
-    <p:spTree>
-      <p:nvGrpSpPr>
-        <p:cNvPr id="1" name=""/>
-        <p:cNvGrpSpPr/>
-        <p:nvPr/>
-      </p:nvGrpSpPr>
-      <p:grpSpPr>
-        <a:xfrm>
-          <a:off x="0" y="0"/>
-          <a:ext cx="0" cy="0"/>
-          <a:chOff x="0" y="0"/>
-          <a:chExt cx="0" cy="0"/>
-        </a:xfrm>
-      </p:grpSpPr>
-      <p:sp>
-        <p:nvSpPr>
-          <p:cNvPr id="2" name="Title 1"/>
-          <p:cNvSpPr>
-            <a:spLocks noGrp="1"/>
-          </p:cNvSpPr>
-          <p:nvPr>
-            <p:ph type="title"/>
-          </p:nvPr>
-        </p:nvSpPr>
-        <p:spPr/>
-        <p:txBody>
-          <a:bodyPr/>
-          <a:lstStyle/>
-          <a:p>
-            <a:r>
-              <a:rPr lang="en-US" dirty="0" smtClean="0"/>
-              <a:t>Clean </a:t>
-            </a:r>
-            <a:r>
-              <a:rPr lang="en-US" dirty="0" err="1" smtClean="0"/>
-              <a:t>Xaml</a:t>
-            </a:r>
-            <a:endParaRPr lang="en-US" dirty="0"/>
-          </a:p>
-        </p:txBody>
-      </p:sp>
-      <p:sp>
-        <p:nvSpPr>
-          <p:cNvPr id="3" name="Content Placeholder 2"/>
-          <p:cNvSpPr>
-            <a:spLocks noGrp="1"/>
-          </p:cNvSpPr>
-          <p:nvPr>
-            <p:ph idx="1"/>
-          </p:nvPr>
-        </p:nvSpPr>
-        <p:spPr/>
-        <p:txBody>
-          <a:bodyPr/>
-          <a:lstStyle/>
-          <a:p>
-            <a:r>
-              <a:rPr lang="en-US" dirty="0" smtClean="0"/>
-              <a:t>We get upset if our classes are heavily nested and over 1k lines long but have no issue with our </a:t>
-            </a:r>
-            <a:r>
-              <a:rPr lang="en-US" dirty="0" err="1" smtClean="0"/>
-              <a:t>xaml</a:t>
-            </a:r>
-            <a:r>
-              <a:rPr lang="en-US" dirty="0" smtClean="0"/>
-              <a:t> files?</a:t>
-            </a:r>
-          </a:p>
-          <a:p>
-            <a:r>
-              <a:rPr lang="en-US" dirty="0" smtClean="0"/>
-              <a:t>Adding nested elements increases the likelihood of errors creeping in during design</a:t>
-            </a:r>
-          </a:p>
-          <a:p>
-            <a:endParaRPr lang="en-US" dirty="0"/>
-          </a:p>
-        </p:txBody>
-      </p:sp>
-    </p:spTree>
   </p:cSld>
   <p:clrMapOvr>
     <a:masterClrMapping/>
@@ -24208,74 +24378,28 @@
           <a:p>
             <a:r>
               <a:rPr lang="en-US" dirty="0" smtClean="0"/>
-              <a:t>Visual Editor = Code Gen</a:t>
+              <a:t>WPF Truth</a:t>
             </a:r>
             <a:endParaRPr lang="en-US" dirty="0"/>
           </a:p>
         </p:txBody>
       </p:sp>
-      <p:sp>
-        <p:nvSpPr>
-          <p:cNvPr id="3" name="Content Placeholder 2"/>
-          <p:cNvSpPr>
-            <a:spLocks noGrp="1"/>
-          </p:cNvSpPr>
-          <p:nvPr>
-            <p:ph idx="1"/>
-          </p:nvPr>
-        </p:nvSpPr>
-        <p:spPr/>
-        <p:txBody>
-          <a:bodyPr/>
-          <a:lstStyle/>
-          <a:p>
-            <a:r>
-              <a:rPr lang="en-US" dirty="0" smtClean="0"/>
-              <a:t>We should have the same hesitation over using a visual editor as we do using code generation. </a:t>
-            </a:r>
-          </a:p>
-          <a:p>
-            <a:endParaRPr lang="en-US" dirty="0" smtClean="0"/>
-          </a:p>
-          <a:p>
-            <a:pPr lvl="1"/>
-            <a:r>
-              <a:rPr lang="en-US" dirty="0" smtClean="0"/>
-              <a:t>All </a:t>
-            </a:r>
-            <a:r>
-              <a:rPr lang="en-US" dirty="0" err="1" smtClean="0"/>
-              <a:t>xaml</a:t>
-            </a:r>
-            <a:r>
-              <a:rPr lang="en-US" dirty="0" smtClean="0"/>
-              <a:t> is code</a:t>
-            </a:r>
-          </a:p>
-          <a:p>
-            <a:pPr lvl="1"/>
-            <a:r>
-              <a:rPr lang="en-US" dirty="0" smtClean="0"/>
-              <a:t>All visual editors generate </a:t>
-            </a:r>
-            <a:r>
-              <a:rPr lang="en-US" dirty="0" err="1" smtClean="0"/>
-              <a:t>xaml</a:t>
-            </a:r>
-            <a:endParaRPr lang="en-US" dirty="0" smtClean="0"/>
-          </a:p>
-          <a:p>
-            <a:pPr lvl="1"/>
-            <a:r>
-              <a:rPr lang="en-US" dirty="0" smtClean="0"/>
-              <a:t>Then all visual editors generate code</a:t>
-            </a:r>
-          </a:p>
-          <a:p>
-            <a:endParaRPr lang="en-US" dirty="0" smtClean="0"/>
-          </a:p>
-        </p:txBody>
-      </p:sp>
+      <p:graphicFrame>
+        <p:nvGraphicFramePr>
+          <p:cNvPr id="4" name="Diagram 3"/>
+          <p:cNvGraphicFramePr/>
+          <p:nvPr/>
+        </p:nvGraphicFramePr>
+        <p:xfrm>
+          <a:off x="1524000" y="1397000"/>
+          <a:ext cx="6096000" cy="4064000"/>
+        </p:xfrm>
+        <a:graphic>
+          <a:graphicData uri="http://schemas.openxmlformats.org/drawingml/2006/diagram">
+            <dgm:relIds xmlns:dgm="http://schemas.openxmlformats.org/drawingml/2006/diagram" xmlns:r="http://schemas.openxmlformats.org/officeDocument/2006/relationships" r:dm="rId2" r:lo="rId3" r:qs="rId4" r:cs="rId5"/>
+          </a:graphicData>
+        </a:graphic>
+      </p:graphicFrame>
     </p:spTree>
   </p:cSld>
   <p:clrMapOvr>
@@ -24318,7 +24442,11 @@
           <a:p>
             <a:r>
               <a:rPr lang="en-US" dirty="0" smtClean="0"/>
-              <a:t>ML = Markup Language</a:t>
+              <a:t>Clean </a:t>
+            </a:r>
+            <a:r>
+              <a:rPr lang="en-US" dirty="0" err="1" smtClean="0"/>
+              <a:t>Xaml</a:t>
             </a:r>
             <a:endParaRPr lang="en-US" dirty="0"/>
           </a:p>
@@ -24341,44 +24469,25 @@
           <a:p>
             <a:r>
               <a:rPr lang="en-US" dirty="0" smtClean="0"/>
-              <a:t>If XAML is a markup, what other markup language do we know of?</a:t>
-            </a:r>
-          </a:p>
-          <a:p>
+              <a:t>We get upset if our classes are heavily nested and over 1k lines long but have no issue with our </a:t>
+            </a:r>
+            <a:r>
+              <a:rPr lang="en-US" dirty="0" err="1" smtClean="0"/>
+              <a:t>xaml</a:t>
+            </a:r>
             <a:r>
               <a:rPr lang="en-US" dirty="0" smtClean="0"/>
-              <a:t>HTML!</a:t>
+              <a:t> files?</a:t>
             </a:r>
           </a:p>
           <a:p>
             <a:r>
               <a:rPr lang="en-US" dirty="0" smtClean="0"/>
-              <a:t>We </a:t>
-            </a:r>
-            <a:r>
-              <a:rPr lang="en-US" dirty="0" smtClean="0"/>
-              <a:t>should learn from the web </a:t>
-            </a:r>
-            <a:endParaRPr lang="en-US" dirty="0" smtClean="0"/>
-          </a:p>
-          <a:p>
-            <a:r>
-              <a:rPr lang="en-US" dirty="0" smtClean="0"/>
-              <a:t>The web h</a:t>
-            </a:r>
-            <a:r>
-              <a:rPr lang="en-US" dirty="0" smtClean="0"/>
-              <a:t>as </a:t>
-            </a:r>
-            <a:r>
-              <a:rPr lang="en-US" dirty="0" smtClean="0"/>
-              <a:t>YEARS of UI markup </a:t>
-            </a:r>
-            <a:r>
-              <a:rPr lang="en-US" dirty="0" smtClean="0"/>
-              <a:t>experience</a:t>
-            </a:r>
-            <a:endParaRPr lang="en-US" dirty="0" smtClean="0"/>
+              <a:t>Adding nested elements increases the likelihood of errors creeping in during design</a:t>
+            </a:r>
+          </a:p>
+          <a:p>
+            <a:endParaRPr lang="en-US" dirty="0"/>
           </a:p>
         </p:txBody>
       </p:sp>
@@ -24424,7 +24533,7 @@
           <a:p>
             <a:r>
               <a:rPr lang="en-US" dirty="0" smtClean="0"/>
-              <a:t>Semantics</a:t>
+              <a:t>Visual Editor = Code Gen</a:t>
             </a:r>
             <a:endParaRPr lang="en-US" dirty="0"/>
           </a:p>
@@ -24440,44 +24549,103 @@
             <p:ph idx="1"/>
           </p:nvPr>
         </p:nvSpPr>
-        <p:spPr/>
+        <p:spPr>
+          <a:xfrm>
+            <a:off x="457200" y="1600201"/>
+            <a:ext cx="8305800" cy="1905000"/>
+          </a:xfrm>
+        </p:spPr>
         <p:txBody>
           <a:bodyPr/>
           <a:lstStyle/>
           <a:p>
-            <a:pPr>
-              <a:buNone/>
-            </a:pPr>
-            <a:r>
-              <a:rPr lang="en-US" dirty="0"/>
-              <a:t>In markup, semantics is concerned with the meaning of an element and how that element describes that content it contains </a:t>
-            </a:r>
-          </a:p>
-          <a:p>
-            <a:pPr>
-              <a:buNone/>
-            </a:pPr>
-            <a:r>
-              <a:rPr lang="en-US" dirty="0"/>
-              <a:t>				– Molly </a:t>
-            </a:r>
-            <a:r>
-              <a:rPr lang="en-US" dirty="0" err="1"/>
-              <a:t>Holzschlag</a:t>
-            </a:r>
-            <a:endParaRPr lang="en-US" dirty="0"/>
-          </a:p>
-          <a:p>
-            <a:endParaRPr lang="en-US" dirty="0"/>
+            <a:r>
+              <a:rPr lang="en-US" dirty="0" smtClean="0"/>
+              <a:t>We should have the same hesitation over using a visual editor as we do using code generation. </a:t>
+            </a:r>
+          </a:p>
+          <a:p>
+            <a:endParaRPr lang="en-US" dirty="0" smtClean="0"/>
+          </a:p>
+          <a:p>
+            <a:endParaRPr lang="en-US" dirty="0" smtClean="0"/>
+          </a:p>
+        </p:txBody>
+      </p:sp>
+      <p:sp>
+        <p:nvSpPr>
+          <p:cNvPr id="4" name="TextBox 3"/>
+          <p:cNvSpPr txBox="1"/>
+          <p:nvPr/>
+        </p:nvSpPr>
+        <p:spPr>
+          <a:xfrm>
+            <a:off x="762000" y="3581400"/>
+            <a:ext cx="7543800" cy="2062103"/>
+          </a:xfrm>
+          <a:prstGeom prst="rect">
+            <a:avLst/>
+          </a:prstGeom>
+        </p:spPr>
+        <p:style>
+          <a:lnRef idx="1">
+            <a:schemeClr val="accent1"/>
+          </a:lnRef>
+          <a:fillRef idx="2">
+            <a:schemeClr val="accent1"/>
+          </a:fillRef>
+          <a:effectRef idx="1">
+            <a:schemeClr val="accent1"/>
+          </a:effectRef>
+          <a:fontRef idx="minor">
+            <a:schemeClr val="dk1"/>
+          </a:fontRef>
+        </p:style>
+        <p:txBody>
+          <a:bodyPr wrap="square" rtlCol="0">
+            <a:spAutoFit/>
+          </a:bodyPr>
+          <a:lstStyle/>
+          <a:p>
+            <a:pPr lvl="1"/>
+            <a:r>
+              <a:rPr lang="en-US" sz="3200" dirty="0"/>
+              <a:t>All </a:t>
+            </a:r>
+            <a:r>
+              <a:rPr lang="en-US" sz="3200" dirty="0" err="1"/>
+              <a:t>xaml</a:t>
+            </a:r>
+            <a:r>
+              <a:rPr lang="en-US" sz="3200" dirty="0"/>
+              <a:t> is code</a:t>
+            </a:r>
+          </a:p>
+          <a:p>
+            <a:pPr lvl="1"/>
+            <a:r>
+              <a:rPr lang="en-US" sz="3200" dirty="0"/>
+              <a:t>All visual editors generate </a:t>
+            </a:r>
+            <a:r>
+              <a:rPr lang="en-US" sz="3200" dirty="0" err="1"/>
+              <a:t>xaml</a:t>
+            </a:r>
+            <a:endParaRPr lang="en-US" sz="3200" dirty="0"/>
+          </a:p>
+          <a:p>
+            <a:pPr lvl="1"/>
+            <a:r>
+              <a:rPr lang="en-US" sz="3200" dirty="0"/>
+              <a:t>Then all visual editors generate code</a:t>
+            </a:r>
+          </a:p>
+          <a:p>
+            <a:endParaRPr lang="en-US" sz="3200" dirty="0"/>
           </a:p>
         </p:txBody>
       </p:sp>
     </p:spTree>
-    <p:extLst>
-      <p:ext uri="{BB962C8B-B14F-4D97-AF65-F5344CB8AC3E}">
-        <p14:creationId xmlns:p14="http://schemas.microsoft.com/office/powerpoint/2010/main" val="2277484368"/>
-      </p:ext>
-    </p:extLst>
   </p:cSld>
   <p:clrMapOvr>
     <a:masterClrMapping/>
@@ -24519,11 +24687,7 @@
           <a:p>
             <a:r>
               <a:rPr lang="en-US" dirty="0" smtClean="0"/>
-              <a:t>Why </a:t>
-            </a:r>
-            <a:r>
-              <a:rPr lang="en-US" dirty="0" smtClean="0"/>
-              <a:t>Semantics</a:t>
+              <a:t>ML = Markup Language</a:t>
             </a:r>
             <a:endParaRPr lang="en-US" dirty="0"/>
           </a:p>
@@ -24546,38 +24710,26 @@
           <a:p>
             <a:r>
               <a:rPr lang="en-US" dirty="0" smtClean="0"/>
-              <a:t>Meaningful markup and structure simplifies </a:t>
-            </a:r>
+              <a:t>If XAML is a markup, what other markup language do we know of?</a:t>
+            </a:r>
+          </a:p>
+          <a:p>
             <a:r>
               <a:rPr lang="en-US" dirty="0" smtClean="0"/>
-              <a:t>design</a:t>
+              <a:t>HTML!</a:t>
             </a:r>
           </a:p>
           <a:p>
             <a:r>
               <a:rPr lang="en-US" dirty="0" smtClean="0"/>
-              <a:t>Reduces time to create views</a:t>
-            </a:r>
-            <a:endParaRPr lang="en-US" dirty="0" smtClean="0"/>
+              <a:t>We should learn from the web </a:t>
+            </a:r>
           </a:p>
           <a:p>
             <a:r>
               <a:rPr lang="en-US" dirty="0" smtClean="0"/>
-              <a:t>Reduces time to mentally deconstruct a doc</a:t>
-            </a:r>
-          </a:p>
-          <a:p>
-            <a:r>
-              <a:rPr lang="en-US" dirty="0" smtClean="0"/>
-              <a:t>Reduce margins and costs of errors</a:t>
-            </a:r>
-          </a:p>
-          <a:p>
-            <a:r>
-              <a:rPr lang="en-US" dirty="0" smtClean="0"/>
-              <a:t>Simplifies the understanding of markup written by another developer</a:t>
-            </a:r>
-            <a:endParaRPr lang="en-US" dirty="0"/>
+              <a:t>The web has YEARS of UI markup experience</a:t>
+            </a:r>
           </a:p>
         </p:txBody>
       </p:sp>
@@ -24590,6 +24742,196 @@
 </file>
 
 <file path=ppt/slides/slide64.xml><?xml version="1.0" encoding="utf-8"?>
+<p:sld xmlns:a="http://schemas.openxmlformats.org/drawingml/2006/main" xmlns:r="http://schemas.openxmlformats.org/officeDocument/2006/relationships" xmlns:p="http://schemas.openxmlformats.org/presentationml/2006/main">
+  <p:cSld>
+    <p:spTree>
+      <p:nvGrpSpPr>
+        <p:cNvPr id="1" name=""/>
+        <p:cNvGrpSpPr/>
+        <p:nvPr/>
+      </p:nvGrpSpPr>
+      <p:grpSpPr>
+        <a:xfrm>
+          <a:off x="0" y="0"/>
+          <a:ext cx="0" cy="0"/>
+          <a:chOff x="0" y="0"/>
+          <a:chExt cx="0" cy="0"/>
+        </a:xfrm>
+      </p:grpSpPr>
+      <p:sp>
+        <p:nvSpPr>
+          <p:cNvPr id="2" name="Title 1"/>
+          <p:cNvSpPr>
+            <a:spLocks noGrp="1"/>
+          </p:cNvSpPr>
+          <p:nvPr>
+            <p:ph type="title"/>
+          </p:nvPr>
+        </p:nvSpPr>
+        <p:spPr/>
+        <p:txBody>
+          <a:bodyPr/>
+          <a:lstStyle/>
+          <a:p>
+            <a:r>
+              <a:rPr lang="en-US" dirty="0" smtClean="0"/>
+              <a:t>Semantics</a:t>
+            </a:r>
+            <a:endParaRPr lang="en-US" dirty="0"/>
+          </a:p>
+        </p:txBody>
+      </p:sp>
+      <p:sp>
+        <p:nvSpPr>
+          <p:cNvPr id="3" name="Content Placeholder 2"/>
+          <p:cNvSpPr>
+            <a:spLocks noGrp="1"/>
+          </p:cNvSpPr>
+          <p:nvPr>
+            <p:ph idx="1"/>
+          </p:nvPr>
+        </p:nvSpPr>
+        <p:spPr/>
+        <p:txBody>
+          <a:bodyPr/>
+          <a:lstStyle/>
+          <a:p>
+            <a:pPr>
+              <a:buNone/>
+            </a:pPr>
+            <a:r>
+              <a:rPr lang="en-US" dirty="0"/>
+              <a:t>In markup, semantics is concerned with the meaning of an element and how that element describes that content it contains </a:t>
+            </a:r>
+          </a:p>
+          <a:p>
+            <a:pPr>
+              <a:buNone/>
+            </a:pPr>
+            <a:r>
+              <a:rPr lang="en-US" dirty="0"/>
+              <a:t>				– Molly </a:t>
+            </a:r>
+            <a:r>
+              <a:rPr lang="en-US" dirty="0" err="1"/>
+              <a:t>Holzschlag</a:t>
+            </a:r>
+            <a:endParaRPr lang="en-US" dirty="0"/>
+          </a:p>
+          <a:p>
+            <a:endParaRPr lang="en-US" dirty="0"/>
+          </a:p>
+        </p:txBody>
+      </p:sp>
+    </p:spTree>
+    <p:extLst>
+      <p:ext uri="{BB962C8B-B14F-4D97-AF65-F5344CB8AC3E}">
+        <p14:creationId xmlns:p14="http://schemas.microsoft.com/office/powerpoint/2010/main" val="2277484368"/>
+      </p:ext>
+    </p:extLst>
+  </p:cSld>
+  <p:clrMapOvr>
+    <a:masterClrMapping/>
+  </p:clrMapOvr>
+</p:sld>
+</file>
+
+<file path=ppt/slides/slide65.xml><?xml version="1.0" encoding="utf-8"?>
+<p:sld xmlns:a="http://schemas.openxmlformats.org/drawingml/2006/main" xmlns:r="http://schemas.openxmlformats.org/officeDocument/2006/relationships" xmlns:p="http://schemas.openxmlformats.org/presentationml/2006/main">
+  <p:cSld>
+    <p:spTree>
+      <p:nvGrpSpPr>
+        <p:cNvPr id="1" name=""/>
+        <p:cNvGrpSpPr/>
+        <p:nvPr/>
+      </p:nvGrpSpPr>
+      <p:grpSpPr>
+        <a:xfrm>
+          <a:off x="0" y="0"/>
+          <a:ext cx="0" cy="0"/>
+          <a:chOff x="0" y="0"/>
+          <a:chExt cx="0" cy="0"/>
+        </a:xfrm>
+      </p:grpSpPr>
+      <p:sp>
+        <p:nvSpPr>
+          <p:cNvPr id="2" name="Title 1"/>
+          <p:cNvSpPr>
+            <a:spLocks noGrp="1"/>
+          </p:cNvSpPr>
+          <p:nvPr>
+            <p:ph type="title"/>
+          </p:nvPr>
+        </p:nvSpPr>
+        <p:spPr/>
+        <p:txBody>
+          <a:bodyPr/>
+          <a:lstStyle/>
+          <a:p>
+            <a:r>
+              <a:rPr lang="en-US" dirty="0" smtClean="0"/>
+              <a:t>Why Semantics</a:t>
+            </a:r>
+            <a:endParaRPr lang="en-US" dirty="0"/>
+          </a:p>
+        </p:txBody>
+      </p:sp>
+      <p:sp>
+        <p:nvSpPr>
+          <p:cNvPr id="3" name="Content Placeholder 2"/>
+          <p:cNvSpPr>
+            <a:spLocks noGrp="1"/>
+          </p:cNvSpPr>
+          <p:nvPr>
+            <p:ph idx="1"/>
+          </p:nvPr>
+        </p:nvSpPr>
+        <p:spPr/>
+        <p:txBody>
+          <a:bodyPr/>
+          <a:lstStyle/>
+          <a:p>
+            <a:r>
+              <a:rPr lang="en-US" dirty="0" smtClean="0"/>
+              <a:t>Meaningful markup and structure simplifies design</a:t>
+            </a:r>
+          </a:p>
+          <a:p>
+            <a:r>
+              <a:rPr lang="en-US" dirty="0" smtClean="0"/>
+              <a:t>Reduces time to create views</a:t>
+            </a:r>
+          </a:p>
+          <a:p>
+            <a:r>
+              <a:rPr lang="en-US" dirty="0" smtClean="0"/>
+              <a:t>Reduces time to mentally deconstruct a doc</a:t>
+            </a:r>
+          </a:p>
+          <a:p>
+            <a:r>
+              <a:rPr lang="en-US" dirty="0" smtClean="0"/>
+              <a:t>Reduce margins and costs of errors</a:t>
+            </a:r>
+          </a:p>
+          <a:p>
+            <a:r>
+              <a:rPr lang="en-US" dirty="0" smtClean="0"/>
+              <a:t>Simplifies the understanding of markup written by another developer</a:t>
+            </a:r>
+            <a:endParaRPr lang="en-US" dirty="0"/>
+          </a:p>
+        </p:txBody>
+      </p:sp>
+    </p:spTree>
+  </p:cSld>
+  <p:clrMapOvr>
+    <a:masterClrMapping/>
+  </p:clrMapOvr>
+</p:sld>
+</file>
+
+<file path=ppt/slides/slide66.xml><?xml version="1.0" encoding="utf-8"?>
 <p:sld xmlns:a="http://schemas.openxmlformats.org/drawingml/2006/main" xmlns:r="http://schemas.openxmlformats.org/officeDocument/2006/relationships" xmlns:p="http://schemas.openxmlformats.org/presentationml/2006/main">
   <p:cSld>
     <p:spTree>
@@ -24742,17 +25084,8 @@
           <a:p>
             <a:r>
               <a:rPr lang="en-US" dirty="0" smtClean="0"/>
-              <a:t>Setup </a:t>
-            </a:r>
-            <a:r>
-              <a:rPr lang="en-US" dirty="0" smtClean="0"/>
-              <a:t>semantic naming </a:t>
-            </a:r>
-            <a:r>
-              <a:rPr lang="en-US" dirty="0" smtClean="0"/>
-              <a:t>conventions for teams</a:t>
-            </a:r>
-            <a:endParaRPr lang="en-US" dirty="0" smtClean="0"/>
+              <a:t>Setup semantic naming conventions for teams</a:t>
+            </a:r>
           </a:p>
         </p:txBody>
       </p:sp>
@@ -24816,205 +25149,6 @@
           </a:p>
         </p:txBody>
       </p:sp>
-    </p:spTree>
-  </p:cSld>
-  <p:clrMapOvr>
-    <a:masterClrMapping/>
-  </p:clrMapOvr>
-</p:sld>
-</file>
-
-<file path=ppt/slides/slide65.xml><?xml version="1.0" encoding="utf-8"?>
-<p:sld xmlns:a="http://schemas.openxmlformats.org/drawingml/2006/main" xmlns:r="http://schemas.openxmlformats.org/officeDocument/2006/relationships" xmlns:p="http://schemas.openxmlformats.org/presentationml/2006/main">
-  <p:cSld>
-    <p:spTree>
-      <p:nvGrpSpPr>
-        <p:cNvPr id="1" name=""/>
-        <p:cNvGrpSpPr/>
-        <p:nvPr/>
-      </p:nvGrpSpPr>
-      <p:grpSpPr>
-        <a:xfrm>
-          <a:off x="0" y="0"/>
-          <a:ext cx="0" cy="0"/>
-          <a:chOff x="0" y="0"/>
-          <a:chExt cx="0" cy="0"/>
-        </a:xfrm>
-      </p:grpSpPr>
-      <p:sp>
-        <p:nvSpPr>
-          <p:cNvPr id="2" name="Title 1"/>
-          <p:cNvSpPr>
-            <a:spLocks noGrp="1"/>
-          </p:cNvSpPr>
-          <p:nvPr>
-            <p:ph type="title"/>
-          </p:nvPr>
-        </p:nvSpPr>
-        <p:spPr/>
-        <p:txBody>
-          <a:bodyPr/>
-          <a:lstStyle/>
-          <a:p>
-            <a:r>
-              <a:rPr lang="en-US" dirty="0" smtClean="0"/>
-              <a:t>Breakdown Apps</a:t>
-            </a:r>
-            <a:endParaRPr lang="en-US" dirty="0"/>
-          </a:p>
-        </p:txBody>
-      </p:sp>
-      <p:sp>
-        <p:nvSpPr>
-          <p:cNvPr id="3" name="Content Placeholder 2"/>
-          <p:cNvSpPr>
-            <a:spLocks noGrp="1"/>
-          </p:cNvSpPr>
-          <p:nvPr>
-            <p:ph idx="1"/>
-          </p:nvPr>
-        </p:nvSpPr>
-        <p:spPr/>
-        <p:txBody>
-          <a:bodyPr/>
-          <a:lstStyle/>
-          <a:p>
-            <a:r>
-              <a:rPr lang="en-US" dirty="0" smtClean="0"/>
-              <a:t>Get some screen shots and then breakdown screen</a:t>
-            </a:r>
-            <a:endParaRPr lang="en-US" dirty="0"/>
-          </a:p>
-        </p:txBody>
-      </p:sp>
-    </p:spTree>
-  </p:cSld>
-  <p:clrMapOvr>
-    <a:masterClrMapping/>
-  </p:clrMapOvr>
-</p:sld>
-</file>
-
-<file path=ppt/slides/slide66.xml><?xml version="1.0" encoding="utf-8"?>
-<p:sld xmlns:a="http://schemas.openxmlformats.org/drawingml/2006/main" xmlns:r="http://schemas.openxmlformats.org/officeDocument/2006/relationships" xmlns:p="http://schemas.openxmlformats.org/presentationml/2006/main">
-  <p:cSld>
-    <p:spTree>
-      <p:nvGrpSpPr>
-        <p:cNvPr id="1" name=""/>
-        <p:cNvGrpSpPr/>
-        <p:nvPr/>
-      </p:nvGrpSpPr>
-      <p:grpSpPr>
-        <a:xfrm>
-          <a:off x="0" y="0"/>
-          <a:ext cx="0" cy="0"/>
-          <a:chOff x="0" y="0"/>
-          <a:chExt cx="0" cy="0"/>
-        </a:xfrm>
-      </p:grpSpPr>
-      <p:sp>
-        <p:nvSpPr>
-          <p:cNvPr id="2" name="Title 1"/>
-          <p:cNvSpPr>
-            <a:spLocks noGrp="1"/>
-          </p:cNvSpPr>
-          <p:nvPr>
-            <p:ph type="title"/>
-          </p:nvPr>
-        </p:nvSpPr>
-        <p:spPr/>
-        <p:txBody>
-          <a:bodyPr/>
-          <a:lstStyle/>
-          <a:p>
-            <a:r>
-              <a:rPr lang="en-US" dirty="0" smtClean="0"/>
-              <a:t>Custom Controls</a:t>
-            </a:r>
-            <a:endParaRPr lang="en-US" dirty="0"/>
-          </a:p>
-        </p:txBody>
-      </p:sp>
-      <p:sp>
-        <p:nvSpPr>
-          <p:cNvPr id="3" name="Content Placeholder 2"/>
-          <p:cNvSpPr>
-            <a:spLocks noGrp="1"/>
-          </p:cNvSpPr>
-          <p:nvPr>
-            <p:ph idx="1"/>
-          </p:nvPr>
-        </p:nvSpPr>
-        <p:spPr/>
-        <p:txBody>
-          <a:bodyPr/>
-          <a:lstStyle/>
-          <a:p>
-            <a:r>
-              <a:rPr lang="en-US" dirty="0" smtClean="0"/>
-              <a:t>Declare semantic controls</a:t>
-            </a:r>
-          </a:p>
-          <a:p>
-            <a:r>
-              <a:rPr lang="en-US" dirty="0" smtClean="0"/>
-              <a:t>Allows setting styles by target type</a:t>
-            </a:r>
-          </a:p>
-          <a:p>
-            <a:r>
-              <a:rPr lang="en-US" dirty="0" smtClean="0"/>
-              <a:t>No preconceived ideas on template implementation</a:t>
-            </a:r>
-          </a:p>
-          <a:p>
-            <a:pPr lvl="1"/>
-            <a:r>
-              <a:rPr lang="en-US" dirty="0" smtClean="0"/>
-              <a:t>Label template that uses a </a:t>
-            </a:r>
-            <a:r>
-              <a:rPr lang="en-US" dirty="0" err="1" smtClean="0"/>
-              <a:t>Listbox</a:t>
-            </a:r>
-            <a:r>
-              <a:rPr lang="en-US" dirty="0" smtClean="0"/>
-              <a:t> would be confusing</a:t>
-            </a:r>
-          </a:p>
-          <a:p>
-            <a:r>
-              <a:rPr lang="en-US" dirty="0" smtClean="0"/>
-              <a:t>Section Title example</a:t>
-            </a:r>
-            <a:endParaRPr lang="en-US" dirty="0"/>
-          </a:p>
-        </p:txBody>
-      </p:sp>
-      <p:pic>
-        <p:nvPicPr>
-          <p:cNvPr id="4" name="Picture 3" descr="visualstudio.jpg"/>
-          <p:cNvPicPr>
-            <a:picLocks noChangeAspect="1"/>
-          </p:cNvPicPr>
-          <p:nvPr/>
-        </p:nvPicPr>
-        <p:blipFill>
-          <a:blip r:embed="rId2" cstate="print"/>
-          <a:stretch>
-            <a:fillRect/>
-          </a:stretch>
-        </p:blipFill>
-        <p:spPr>
-          <a:xfrm>
-            <a:off x="7839075" y="6076950"/>
-            <a:ext cx="1304925" cy="781050"/>
-          </a:xfrm>
-          <a:prstGeom prst="rect">
-            <a:avLst/>
-          </a:prstGeom>
-        </p:spPr>
-      </p:pic>
     </p:spTree>
   </p:cSld>
   <p:clrMapOvr>
@@ -25057,7 +25191,7 @@
           <a:p>
             <a:r>
               <a:rPr lang="en-US" dirty="0" smtClean="0"/>
-              <a:t>Presentation &amp; Structure</a:t>
+              <a:t>Breakdown apps</a:t>
             </a:r>
             <a:endParaRPr lang="en-US" dirty="0"/>
           </a:p>
@@ -25065,12 +25199,12 @@
       </p:sp>
       <p:sp>
         <p:nvSpPr>
-          <p:cNvPr id="3" name="Content Placeholder 2"/>
+          <p:cNvPr id="3" name="Text Placeholder 2"/>
           <p:cNvSpPr>
             <a:spLocks noGrp="1"/>
           </p:cNvSpPr>
           <p:nvPr>
-            <p:ph idx="1"/>
+            <p:ph type="body" idx="1"/>
           </p:nvPr>
         </p:nvSpPr>
         <p:spPr/>
@@ -25078,26 +25212,16 @@
           <a:bodyPr/>
           <a:lstStyle/>
           <a:p>
-            <a:pPr>
-              <a:buNone/>
-            </a:pPr>
-            <a:r>
-              <a:rPr lang="en-US" dirty="0" smtClean="0"/>
-              <a:t>I committed the </a:t>
-            </a:r>
-            <a:r>
-              <a:rPr lang="en-US" dirty="0" err="1" smtClean="0"/>
-              <a:t>hangable</a:t>
-            </a:r>
-            <a:r>
-              <a:rPr lang="en-US" dirty="0" smtClean="0"/>
-              <a:t> offense of mixing structure with presentation – David Siegel</a:t>
-            </a:r>
-            <a:endParaRPr lang="en-US" dirty="0"/>
+            <a:endParaRPr lang="en-US"/>
           </a:p>
         </p:txBody>
       </p:sp>
     </p:spTree>
+    <p:extLst>
+      <p:ext uri="{BB962C8B-B14F-4D97-AF65-F5344CB8AC3E}">
+        <p14:creationId xmlns:p14="http://schemas.microsoft.com/office/powerpoint/2010/main" val="2705112198"/>
+      </p:ext>
+    </p:extLst>
   </p:cSld>
   <p:clrMapOvr>
     <a:masterClrMapping/>
@@ -25122,77 +25246,70 @@
           <a:chExt cx="0" cy="0"/>
         </a:xfrm>
       </p:grpSpPr>
-      <p:sp>
-        <p:nvSpPr>
-          <p:cNvPr id="2" name="Title 1"/>
-          <p:cNvSpPr>
-            <a:spLocks noGrp="1"/>
-          </p:cNvSpPr>
-          <p:nvPr>
-            <p:ph type="title"/>
-          </p:nvPr>
-        </p:nvSpPr>
-        <p:spPr/>
-        <p:txBody>
-          <a:bodyPr/>
-          <a:lstStyle/>
-          <a:p>
-            <a:r>
-              <a:rPr lang="en-US" dirty="0" smtClean="0"/>
-              <a:t>Separation of Concerns</a:t>
-            </a:r>
-            <a:endParaRPr lang="en-US" dirty="0"/>
-          </a:p>
-        </p:txBody>
-      </p:sp>
-      <p:sp>
-        <p:nvSpPr>
-          <p:cNvPr id="3" name="Content Placeholder 2"/>
-          <p:cNvSpPr>
-            <a:spLocks noGrp="1"/>
-          </p:cNvSpPr>
-          <p:nvPr>
-            <p:ph idx="1"/>
-          </p:nvPr>
-        </p:nvSpPr>
-        <p:spPr/>
-        <p:txBody>
-          <a:bodyPr/>
-          <a:lstStyle/>
-          <a:p>
-            <a:r>
-              <a:rPr lang="en-US" dirty="0" smtClean="0"/>
-              <a:t>UI Interaction and logic</a:t>
-            </a:r>
-          </a:p>
-          <a:p>
-            <a:r>
-              <a:rPr lang="en-US" dirty="0" smtClean="0"/>
-              <a:t>Structure and presentation</a:t>
-            </a:r>
-          </a:p>
-          <a:p>
-            <a:r>
-              <a:rPr lang="en-US" dirty="0" smtClean="0"/>
-              <a:t>Focus on content and not presentation</a:t>
-            </a:r>
-          </a:p>
-          <a:p>
-            <a:r>
-              <a:rPr lang="en-US" dirty="0" smtClean="0"/>
-              <a:t>Brings back to editors suck!</a:t>
-            </a:r>
-          </a:p>
-          <a:p>
-            <a:pPr lvl="1"/>
-            <a:r>
-              <a:rPr lang="en-US" dirty="0" smtClean="0"/>
-              <a:t>Great layout panels and then you just drag and drop fixed margins into a grid? WTF!?</a:t>
-            </a:r>
-            <a:endParaRPr lang="en-US" dirty="0"/>
-          </a:p>
-        </p:txBody>
-      </p:sp>
+      <p:pic>
+        <p:nvPicPr>
+          <p:cNvPr id="1026" name="Picture 2"/>
+          <p:cNvPicPr>
+            <a:picLocks noChangeAspect="1" noChangeArrowheads="1"/>
+          </p:cNvPicPr>
+          <p:nvPr/>
+        </p:nvPicPr>
+        <p:blipFill>
+          <a:blip r:embed="rId2">
+            <a:extLst>
+              <a:ext uri="{28A0092B-C50C-407E-A947-70E740481C1C}">
+                <a14:useLocalDpi xmlns:a14="http://schemas.microsoft.com/office/drawing/2010/main" val="0"/>
+              </a:ext>
+            </a:extLst>
+          </a:blip>
+          <a:srcRect/>
+          <a:stretch>
+            <a:fillRect/>
+          </a:stretch>
+        </p:blipFill>
+        <p:spPr bwMode="auto">
+          <a:xfrm>
+            <a:off x="228600" y="990600"/>
+            <a:ext cx="8734425" cy="4505325"/>
+          </a:xfrm>
+          <a:prstGeom prst="rect">
+            <a:avLst/>
+          </a:prstGeom>
+          <a:noFill/>
+          <a:ln>
+            <a:noFill/>
+          </a:ln>
+          <a:effectLst/>
+          <a:extLst>
+            <a:ext uri="{909E8E84-426E-40DD-AFC4-6F175D3DCCD1}">
+              <a14:hiddenFill xmlns:a14="http://schemas.microsoft.com/office/drawing/2010/main">
+                <a:solidFill>
+                  <a:schemeClr val="accent1"/>
+                </a:solidFill>
+              </a14:hiddenFill>
+            </a:ext>
+            <a:ext uri="{91240B29-F687-4F45-9708-019B960494DF}">
+              <a14:hiddenLine xmlns:a14="http://schemas.microsoft.com/office/drawing/2010/main" w="9525">
+                <a:solidFill>
+                  <a:schemeClr val="tx1"/>
+                </a:solidFill>
+                <a:miter lim="800000"/>
+                <a:headEnd/>
+                <a:tailEnd/>
+              </a14:hiddenLine>
+            </a:ext>
+            <a:ext uri="{AF507438-7753-43E0-B8FC-AC1667EBCBE1}">
+              <a14:hiddenEffects xmlns:a14="http://schemas.microsoft.com/office/drawing/2010/main">
+                <a:effectLst>
+                  <a:outerShdw dist="35921" dir="2700000" algn="ctr" rotWithShape="0">
+                    <a:schemeClr val="bg2"/>
+                  </a:outerShdw>
+                </a:effectLst>
+              </a14:hiddenEffects>
+            </a:ext>
+          </a:extLst>
+        </p:spPr>
+      </p:pic>
     </p:spTree>
   </p:cSld>
   <p:clrMapOvr>
@@ -25218,85 +25335,78 @@
           <a:chExt cx="0" cy="0"/>
         </a:xfrm>
       </p:grpSpPr>
-      <p:sp>
-        <p:nvSpPr>
-          <p:cNvPr id="2" name="Title 1"/>
-          <p:cNvSpPr>
-            <a:spLocks noGrp="1"/>
-          </p:cNvSpPr>
-          <p:nvPr>
-            <p:ph type="title"/>
-          </p:nvPr>
-        </p:nvSpPr>
-        <p:spPr/>
-        <p:txBody>
-          <a:bodyPr/>
-          <a:lstStyle/>
-          <a:p>
-            <a:r>
-              <a:rPr lang="en-US" dirty="0" smtClean="0"/>
-              <a:t>Displaying Buttons</a:t>
-            </a:r>
-            <a:endParaRPr lang="en-US" dirty="0"/>
-          </a:p>
-        </p:txBody>
-      </p:sp>
-      <p:sp>
-        <p:nvSpPr>
-          <p:cNvPr id="3" name="Content Placeholder 2"/>
-          <p:cNvSpPr>
-            <a:spLocks noGrp="1"/>
-          </p:cNvSpPr>
+      <p:pic>
+        <p:nvPicPr>
+          <p:cNvPr id="2050" name="Picture 2"/>
+          <p:cNvPicPr>
+            <a:picLocks noGrp="1" noChangeAspect="1" noChangeArrowheads="1"/>
+          </p:cNvPicPr>
           <p:nvPr>
             <p:ph idx="1"/>
           </p:nvPr>
-        </p:nvSpPr>
-        <p:spPr/>
-        <p:txBody>
-          <a:bodyPr/>
-          <a:lstStyle/>
-          <a:p>
-            <a:r>
-              <a:rPr lang="en-US" dirty="0" smtClean="0"/>
-              <a:t>Instead of displaying a </a:t>
-            </a:r>
-            <a:r>
-              <a:rPr lang="en-US" dirty="0" err="1" smtClean="0"/>
-              <a:t>stackpanel</a:t>
-            </a:r>
-            <a:r>
-              <a:rPr lang="en-US" dirty="0" smtClean="0"/>
-              <a:t> with a collection of buttons, lets display an actions control with a collection of actions</a:t>
-            </a:r>
-            <a:endParaRPr lang="en-US" dirty="0"/>
-          </a:p>
-        </p:txBody>
-      </p:sp>
-      <p:pic>
-        <p:nvPicPr>
-          <p:cNvPr id="4" name="Picture 3" descr="visualstudio.jpg"/>
-          <p:cNvPicPr>
-            <a:picLocks noChangeAspect="1"/>
-          </p:cNvPicPr>
-          <p:nvPr/>
         </p:nvPicPr>
         <p:blipFill>
-          <a:blip r:embed="rId2" cstate="print"/>
+          <a:blip r:embed="rId2">
+            <a:extLst>
+              <a:ext uri="{28A0092B-C50C-407E-A947-70E740481C1C}">
+                <a14:useLocalDpi xmlns:a14="http://schemas.microsoft.com/office/drawing/2010/main" val="0"/>
+              </a:ext>
+            </a:extLst>
+          </a:blip>
+          <a:srcRect/>
           <a:stretch>
             <a:fillRect/>
           </a:stretch>
         </p:blipFill>
-        <p:spPr>
+        <p:spPr bwMode="auto">
           <a:xfrm>
-            <a:off x="7839075" y="6076950"/>
-            <a:ext cx="1304925" cy="781050"/>
+            <a:off x="381000" y="762000"/>
+            <a:ext cx="8307866" cy="5410200"/>
           </a:xfrm>
           <a:prstGeom prst="rect">
             <a:avLst/>
           </a:prstGeom>
+          <a:noFill/>
+          <a:ln>
+            <a:noFill/>
+          </a:ln>
+          <a:effectLst/>
+          <a:extLst>
+            <a:ext uri="{909E8E84-426E-40DD-AFC4-6F175D3DCCD1}">
+              <a14:hiddenFill xmlns:a14="http://schemas.microsoft.com/office/drawing/2010/main">
+                <a:solidFill>
+                  <a:schemeClr val="accent1"/>
+                </a:solidFill>
+              </a14:hiddenFill>
+            </a:ext>
+            <a:ext uri="{91240B29-F687-4F45-9708-019B960494DF}">
+              <a14:hiddenLine xmlns:a14="http://schemas.microsoft.com/office/drawing/2010/main" w="9525">
+                <a:solidFill>
+                  <a:schemeClr val="tx1"/>
+                </a:solidFill>
+                <a:miter lim="800000"/>
+                <a:headEnd/>
+                <a:tailEnd/>
+              </a14:hiddenLine>
+            </a:ext>
+            <a:ext uri="{AF507438-7753-43E0-B8FC-AC1667EBCBE1}">
+              <a14:hiddenEffects xmlns:a14="http://schemas.microsoft.com/office/drawing/2010/main">
+                <a:effectLst>
+                  <a:outerShdw dist="35921" dir="2700000" algn="ctr" rotWithShape="0">
+                    <a:schemeClr val="bg2"/>
+                  </a:outerShdw>
+                </a:effectLst>
+              </a14:hiddenEffects>
+            </a:ext>
+          </a:extLst>
         </p:spPr>
       </p:pic>
     </p:spTree>
+    <p:extLst>
+      <p:ext uri="{BB962C8B-B14F-4D97-AF65-F5344CB8AC3E}">
+        <p14:creationId xmlns:p14="http://schemas.microsoft.com/office/powerpoint/2010/main" val="1257363157"/>
+      </p:ext>
+    </p:extLst>
   </p:cSld>
   <p:clrMapOvr>
     <a:masterClrMapping/>
@@ -25388,107 +25498,76 @@
           <a:chExt cx="0" cy="0"/>
         </a:xfrm>
       </p:grpSpPr>
-      <p:sp>
-        <p:nvSpPr>
-          <p:cNvPr id="2" name="Title 1"/>
-          <p:cNvSpPr>
-            <a:spLocks noGrp="1"/>
-          </p:cNvSpPr>
-          <p:nvPr>
-            <p:ph type="title"/>
-          </p:nvPr>
-        </p:nvSpPr>
-        <p:spPr/>
-        <p:txBody>
-          <a:bodyPr/>
-          <a:lstStyle/>
-          <a:p>
-            <a:r>
-              <a:rPr lang="en-US" dirty="0" smtClean="0"/>
-              <a:t>Specialists?</a:t>
-            </a:r>
-            <a:endParaRPr lang="en-US" dirty="0"/>
-          </a:p>
-        </p:txBody>
-      </p:sp>
-      <p:sp>
-        <p:nvSpPr>
-          <p:cNvPr id="3" name="Content Placeholder 2"/>
-          <p:cNvSpPr>
-            <a:spLocks noGrp="1"/>
-          </p:cNvSpPr>
-          <p:nvPr>
-            <p:ph idx="1"/>
-          </p:nvPr>
-        </p:nvSpPr>
-        <p:spPr/>
-        <p:txBody>
-          <a:bodyPr>
-            <a:normAutofit fontScale="92500" lnSpcReduction="10000"/>
-          </a:bodyPr>
-          <a:lstStyle/>
-          <a:p>
-            <a:r>
-              <a:rPr lang="en-US" dirty="0" smtClean="0"/>
-              <a:t>Manage the connections between specialists</a:t>
-            </a:r>
-          </a:p>
-          <a:p>
-            <a:r>
-              <a:rPr lang="en-US" dirty="0" smtClean="0"/>
-              <a:t>Think about the way you work and how you collaborate with others</a:t>
-            </a:r>
-          </a:p>
-          <a:p>
-            <a:r>
-              <a:rPr lang="en-US" dirty="0" smtClean="0"/>
-              <a:t>Designers </a:t>
-            </a:r>
-            <a:r>
-              <a:rPr lang="en-US" dirty="0" err="1" smtClean="0"/>
-              <a:t>vs</a:t>
-            </a:r>
-            <a:r>
-              <a:rPr lang="en-US" dirty="0" smtClean="0"/>
-              <a:t> Developer</a:t>
-            </a:r>
-          </a:p>
-          <a:p>
-            <a:r>
-              <a:rPr lang="en-US" dirty="0" smtClean="0"/>
-              <a:t>“Dev” – “</a:t>
-            </a:r>
-            <a:r>
-              <a:rPr lang="en-US" dirty="0" err="1" smtClean="0"/>
-              <a:t>igners</a:t>
-            </a:r>
-            <a:r>
-              <a:rPr lang="en-US" dirty="0" smtClean="0"/>
-              <a:t>”</a:t>
-            </a:r>
-          </a:p>
-          <a:p>
-            <a:r>
-              <a:rPr lang="en-US" dirty="0" smtClean="0"/>
-              <a:t>Need to see both the design and the code</a:t>
-            </a:r>
-          </a:p>
-          <a:p>
-            <a:r>
-              <a:rPr lang="en-US" dirty="0" smtClean="0"/>
-              <a:t>See the matrix!</a:t>
-            </a:r>
-          </a:p>
-          <a:p>
-            <a:r>
-              <a:rPr lang="en-US" dirty="0" smtClean="0"/>
-              <a:t>Also need to know WPF’s tech capabilities to facilitate creating better UI + design workflow</a:t>
-            </a:r>
-            <a:endParaRPr lang="en-US" dirty="0"/>
-          </a:p>
-        </p:txBody>
-      </p:sp>
+      <p:pic>
+        <p:nvPicPr>
+          <p:cNvPr id="3074" name="Picture 2"/>
+          <p:cNvPicPr>
+            <a:picLocks noChangeAspect="1" noChangeArrowheads="1"/>
+          </p:cNvPicPr>
+          <p:nvPr/>
+        </p:nvPicPr>
+        <p:blipFill>
+          <a:blip r:embed="rId2">
+            <a:extLst>
+              <a:ext uri="{28A0092B-C50C-407E-A947-70E740481C1C}">
+                <a14:useLocalDpi xmlns:a14="http://schemas.microsoft.com/office/drawing/2010/main" val="0"/>
+              </a:ext>
+            </a:extLst>
+          </a:blip>
+          <a:srcRect/>
+          <a:stretch>
+            <a:fillRect/>
+          </a:stretch>
+        </p:blipFill>
+        <p:spPr bwMode="auto">
+          <a:xfrm>
+            <a:off x="1157288" y="871538"/>
+            <a:ext cx="6829425" cy="5114925"/>
+          </a:xfrm>
+          <a:prstGeom prst="rect">
+            <a:avLst/>
+          </a:prstGeom>
+          <a:noFill/>
+          <a:ln>
+            <a:noFill/>
+          </a:ln>
+          <a:effectLst/>
+          <a:extLst>
+            <a:ext uri="{909E8E84-426E-40DD-AFC4-6F175D3DCCD1}">
+              <a14:hiddenFill xmlns:a14="http://schemas.microsoft.com/office/drawing/2010/main">
+                <a:solidFill>
+                  <a:schemeClr val="accent1"/>
+                </a:solidFill>
+              </a14:hiddenFill>
+            </a:ext>
+            <a:ext uri="{91240B29-F687-4F45-9708-019B960494DF}">
+              <a14:hiddenLine xmlns:a14="http://schemas.microsoft.com/office/drawing/2010/main" w="9525">
+                <a:solidFill>
+                  <a:schemeClr val="tx1"/>
+                </a:solidFill>
+                <a:miter lim="800000"/>
+                <a:headEnd/>
+                <a:tailEnd/>
+              </a14:hiddenLine>
+            </a:ext>
+            <a:ext uri="{AF507438-7753-43E0-B8FC-AC1667EBCBE1}">
+              <a14:hiddenEffects xmlns:a14="http://schemas.microsoft.com/office/drawing/2010/main">
+                <a:effectLst>
+                  <a:outerShdw dist="35921" dir="2700000" algn="ctr" rotWithShape="0">
+                    <a:schemeClr val="bg2"/>
+                  </a:outerShdw>
+                </a:effectLst>
+              </a14:hiddenEffects>
+            </a:ext>
+          </a:extLst>
+        </p:spPr>
+      </p:pic>
     </p:spTree>
+    <p:extLst>
+      <p:ext uri="{BB962C8B-B14F-4D97-AF65-F5344CB8AC3E}">
+        <p14:creationId xmlns:p14="http://schemas.microsoft.com/office/powerpoint/2010/main" val="2300386987"/>
+      </p:ext>
+    </p:extLst>
   </p:cSld>
   <p:clrMapOvr>
     <a:masterClrMapping/>
@@ -25513,83 +25592,76 @@
           <a:chExt cx="0" cy="0"/>
         </a:xfrm>
       </p:grpSpPr>
-      <p:sp>
-        <p:nvSpPr>
-          <p:cNvPr id="2" name="Title 1"/>
-          <p:cNvSpPr>
-            <a:spLocks noGrp="1"/>
-          </p:cNvSpPr>
-          <p:nvPr>
-            <p:ph type="title"/>
-          </p:nvPr>
-        </p:nvSpPr>
-        <p:spPr/>
-        <p:txBody>
-          <a:bodyPr/>
-          <a:lstStyle/>
-          <a:p>
-            <a:r>
-              <a:rPr lang="en-US" dirty="0" smtClean="0"/>
-              <a:t>Form</a:t>
-            </a:r>
-            <a:endParaRPr lang="en-US" dirty="0"/>
-          </a:p>
-        </p:txBody>
-      </p:sp>
-      <p:sp>
-        <p:nvSpPr>
-          <p:cNvPr id="3" name="Content Placeholder 2"/>
-          <p:cNvSpPr>
-            <a:spLocks noGrp="1"/>
-          </p:cNvSpPr>
-          <p:nvPr>
-            <p:ph idx="1"/>
-          </p:nvPr>
-        </p:nvSpPr>
-        <p:spPr/>
-        <p:txBody>
-          <a:bodyPr/>
-          <a:lstStyle/>
-          <a:p>
-            <a:r>
-              <a:rPr lang="en-US" dirty="0" smtClean="0"/>
-              <a:t>Why can’t we have a control that figures out what fields to display?!</a:t>
-            </a:r>
-          </a:p>
-          <a:p>
-            <a:r>
-              <a:rPr lang="en-US" dirty="0" smtClean="0"/>
-              <a:t>Let’s do it</a:t>
-            </a:r>
-            <a:endParaRPr lang="en-US" dirty="0"/>
-          </a:p>
-        </p:txBody>
-      </p:sp>
       <p:pic>
         <p:nvPicPr>
-          <p:cNvPr id="4" name="Picture 3" descr="visualstudio.jpg"/>
+          <p:cNvPr id="4098" name="Picture 2"/>
           <p:cNvPicPr>
-            <a:picLocks noChangeAspect="1"/>
+            <a:picLocks noChangeAspect="1" noChangeArrowheads="1"/>
           </p:cNvPicPr>
           <p:nvPr/>
         </p:nvPicPr>
         <p:blipFill>
-          <a:blip r:embed="rId2" cstate="print"/>
+          <a:blip r:embed="rId2">
+            <a:extLst>
+              <a:ext uri="{28A0092B-C50C-407E-A947-70E740481C1C}">
+                <a14:useLocalDpi xmlns:a14="http://schemas.microsoft.com/office/drawing/2010/main" val="0"/>
+              </a:ext>
+            </a:extLst>
+          </a:blip>
+          <a:srcRect/>
           <a:stretch>
             <a:fillRect/>
           </a:stretch>
         </p:blipFill>
-        <p:spPr>
+        <p:spPr bwMode="auto">
           <a:xfrm>
-            <a:off x="7839075" y="6076950"/>
-            <a:ext cx="1304925" cy="781050"/>
+            <a:off x="304800" y="838200"/>
+            <a:ext cx="8672513" cy="4986004"/>
           </a:xfrm>
           <a:prstGeom prst="rect">
             <a:avLst/>
           </a:prstGeom>
+          <a:noFill/>
+          <a:ln>
+            <a:noFill/>
+          </a:ln>
+          <a:effectLst/>
+          <a:extLst>
+            <a:ext uri="{909E8E84-426E-40DD-AFC4-6F175D3DCCD1}">
+              <a14:hiddenFill xmlns:a14="http://schemas.microsoft.com/office/drawing/2010/main">
+                <a:solidFill>
+                  <a:schemeClr val="accent1"/>
+                </a:solidFill>
+              </a14:hiddenFill>
+            </a:ext>
+            <a:ext uri="{91240B29-F687-4F45-9708-019B960494DF}">
+              <a14:hiddenLine xmlns:a14="http://schemas.microsoft.com/office/drawing/2010/main" w="9525">
+                <a:solidFill>
+                  <a:schemeClr val="tx1"/>
+                </a:solidFill>
+                <a:miter lim="800000"/>
+                <a:headEnd/>
+                <a:tailEnd/>
+              </a14:hiddenLine>
+            </a:ext>
+            <a:ext uri="{AF507438-7753-43E0-B8FC-AC1667EBCBE1}">
+              <a14:hiddenEffects xmlns:a14="http://schemas.microsoft.com/office/drawing/2010/main">
+                <a:effectLst>
+                  <a:outerShdw dist="35921" dir="2700000" algn="ctr" rotWithShape="0">
+                    <a:schemeClr val="bg2"/>
+                  </a:outerShdw>
+                </a:effectLst>
+              </a14:hiddenEffects>
+            </a:ext>
+          </a:extLst>
         </p:spPr>
       </p:pic>
     </p:spTree>
+    <p:extLst>
+      <p:ext uri="{BB962C8B-B14F-4D97-AF65-F5344CB8AC3E}">
+        <p14:creationId xmlns:p14="http://schemas.microsoft.com/office/powerpoint/2010/main" val="1100199203"/>
+      </p:ext>
+    </p:extLst>
   </p:cSld>
   <p:clrMapOvr>
     <a:masterClrMapping/>
@@ -25631,7 +25703,7 @@
           <a:p>
             <a:r>
               <a:rPr lang="en-US" dirty="0" smtClean="0"/>
-              <a:t>Rethink grids</a:t>
+              <a:t>Custom Controls</a:t>
             </a:r>
             <a:endParaRPr lang="en-US" dirty="0"/>
           </a:p>
@@ -25639,12 +25711,12 @@
       </p:sp>
       <p:sp>
         <p:nvSpPr>
-          <p:cNvPr id="3" name="Text Placeholder 2"/>
+          <p:cNvPr id="3" name="Content Placeholder 2"/>
           <p:cNvSpPr>
             <a:spLocks noGrp="1"/>
           </p:cNvSpPr>
           <p:nvPr>
-            <p:ph type="body" idx="1"/>
+            <p:ph idx="1"/>
           </p:nvPr>
         </p:nvSpPr>
         <p:spPr/>
@@ -25652,10 +25724,71 @@
           <a:bodyPr/>
           <a:lstStyle/>
           <a:p>
-            <a:endParaRPr lang="en-US"/>
+            <a:r>
+              <a:rPr lang="en-US" dirty="0" smtClean="0"/>
+              <a:t>Declare semantic controls</a:t>
+            </a:r>
+          </a:p>
+          <a:p>
+            <a:r>
+              <a:rPr lang="en-US" dirty="0" smtClean="0"/>
+              <a:t>Allows setting styles by target type</a:t>
+            </a:r>
+          </a:p>
+          <a:p>
+            <a:r>
+              <a:rPr lang="en-US" dirty="0" smtClean="0"/>
+              <a:t>No preconceived ideas on template implementation</a:t>
+            </a:r>
+          </a:p>
+          <a:p>
+            <a:pPr lvl="1"/>
+            <a:r>
+              <a:rPr lang="en-US" dirty="0" smtClean="0"/>
+              <a:t>Label template that uses a </a:t>
+            </a:r>
+            <a:r>
+              <a:rPr lang="en-US" dirty="0" err="1" smtClean="0"/>
+              <a:t>Listbox</a:t>
+            </a:r>
+            <a:r>
+              <a:rPr lang="en-US" dirty="0" smtClean="0"/>
+              <a:t> would be confusing</a:t>
+            </a:r>
+          </a:p>
+          <a:p>
+            <a:r>
+              <a:rPr lang="en-US" dirty="0" smtClean="0"/>
+              <a:t>Section Title example</a:t>
+            </a:r>
+            <a:endParaRPr lang="en-US" dirty="0"/>
           </a:p>
         </p:txBody>
       </p:sp>
+      <p:pic>
+        <p:nvPicPr>
+          <p:cNvPr id="4" name="Picture 3" descr="visualstudio.jpg"/>
+          <p:cNvPicPr>
+            <a:picLocks noChangeAspect="1"/>
+          </p:cNvPicPr>
+          <p:nvPr/>
+        </p:nvPicPr>
+        <p:blipFill>
+          <a:blip r:embed="rId2" cstate="print"/>
+          <a:stretch>
+            <a:fillRect/>
+          </a:stretch>
+        </p:blipFill>
+        <p:spPr>
+          <a:xfrm>
+            <a:off x="7839075" y="6076950"/>
+            <a:ext cx="1304925" cy="781050"/>
+          </a:xfrm>
+          <a:prstGeom prst="rect">
+            <a:avLst/>
+          </a:prstGeom>
+        </p:spPr>
+      </p:pic>
     </p:spTree>
   </p:cSld>
   <p:clrMapOvr>
@@ -25698,7 +25831,7 @@
           <a:p>
             <a:r>
               <a:rPr lang="en-US" dirty="0" smtClean="0"/>
-              <a:t>Grids are inadequate</a:t>
+              <a:t>Presentation &amp; Structure</a:t>
             </a:r>
             <a:endParaRPr lang="en-US" dirty="0"/>
           </a:p>
@@ -25719,21 +25852,20 @@
           <a:bodyPr/>
           <a:lstStyle/>
           <a:p>
+            <a:pPr>
+              <a:buNone/>
+            </a:pPr>
             <a:r>
               <a:rPr lang="en-US" dirty="0" smtClean="0"/>
-              <a:t>Grids represent data</a:t>
-            </a:r>
-          </a:p>
-          <a:p>
+              <a:t>I committed the </a:t>
+            </a:r>
+            <a:r>
+              <a:rPr lang="en-US" dirty="0" err="1" smtClean="0"/>
+              <a:t>hangable</a:t>
+            </a:r>
             <a:r>
               <a:rPr lang="en-US" dirty="0" smtClean="0"/>
-              <a:t>But everything isn’t data</a:t>
-            </a:r>
-          </a:p>
-          <a:p>
-            <a:r>
-              <a:rPr lang="en-US" dirty="0" smtClean="0"/>
-              <a:t>Destroy some myths</a:t>
+              <a:t> offense of mixing structure with presentation – David Siegel</a:t>
             </a:r>
             <a:endParaRPr lang="en-US" dirty="0"/>
           </a:p>
@@ -25781,7 +25913,7 @@
           <a:p>
             <a:r>
               <a:rPr lang="en-US" dirty="0" smtClean="0"/>
-              <a:t>All the world is a list</a:t>
+              <a:t>Separation of Concerns</a:t>
             </a:r>
             <a:endParaRPr lang="en-US" dirty="0"/>
           </a:p>
@@ -25802,6 +25934,35 @@
           <a:bodyPr/>
           <a:lstStyle/>
           <a:p>
+            <a:r>
+              <a:rPr lang="en-US" dirty="0" smtClean="0"/>
+              <a:t>UI Interaction and logic</a:t>
+            </a:r>
+          </a:p>
+          <a:p>
+            <a:r>
+              <a:rPr lang="en-US" dirty="0" smtClean="0"/>
+              <a:t>Structure and presentation</a:t>
+            </a:r>
+          </a:p>
+          <a:p>
+            <a:r>
+              <a:rPr lang="en-US" dirty="0" smtClean="0"/>
+              <a:t>Focus on content and not presentation</a:t>
+            </a:r>
+          </a:p>
+          <a:p>
+            <a:r>
+              <a:rPr lang="en-US" dirty="0" smtClean="0"/>
+              <a:t>Brings back to editors suck!</a:t>
+            </a:r>
+          </a:p>
+          <a:p>
+            <a:pPr lvl="1"/>
+            <a:r>
+              <a:rPr lang="en-US" dirty="0" smtClean="0"/>
+              <a:t>Great layout panels and then you just drag and drop fixed margins into a grid? WTF!?</a:t>
+            </a:r>
             <a:endParaRPr lang="en-US" dirty="0"/>
           </a:p>
         </p:txBody>
@@ -25848,7 +26009,7 @@
           <a:p>
             <a:r>
               <a:rPr lang="en-US" dirty="0" smtClean="0"/>
-              <a:t>Data Templates</a:t>
+              <a:t>Displaying Buttons</a:t>
             </a:r>
             <a:endParaRPr lang="en-US" dirty="0"/>
           </a:p>
@@ -25871,17 +26032,15 @@
           <a:p>
             <a:r>
               <a:rPr lang="en-US" dirty="0" smtClean="0"/>
-              <a:t>Using Keys</a:t>
-            </a:r>
-          </a:p>
-          <a:p>
+              <a:t>Instead of displaying a </a:t>
+            </a:r>
+            <a:r>
+              <a:rPr lang="en-US" dirty="0" err="1" smtClean="0"/>
+              <a:t>stackpanel</a:t>
+            </a:r>
             <a:r>
               <a:rPr lang="en-US" dirty="0" smtClean="0"/>
-              <a:t>Using </a:t>
-            </a:r>
-            <a:r>
-              <a:rPr lang="en-US" dirty="0" err="1" smtClean="0"/>
-              <a:t>DataType</a:t>
+              <a:t> with a collection of buttons, lets display an actions control with a collection of actions</a:t>
             </a:r>
             <a:endParaRPr lang="en-US" dirty="0"/>
           </a:p>
@@ -25953,7 +26112,7 @@
           <a:p>
             <a:r>
               <a:rPr lang="en-US" dirty="0" smtClean="0"/>
-              <a:t>Item Container Style</a:t>
+              <a:t>Form</a:t>
             </a:r>
             <a:endParaRPr lang="en-US" dirty="0"/>
           </a:p>
@@ -25976,13 +26135,13 @@
           <a:p>
             <a:r>
               <a:rPr lang="en-US" dirty="0" smtClean="0"/>
-              <a:t>Style item</a:t>
+              <a:t>Why can’t we have a control that figures out what fields to display?!</a:t>
             </a:r>
           </a:p>
           <a:p>
             <a:r>
               <a:rPr lang="en-US" dirty="0" smtClean="0"/>
-              <a:t>Selected Style</a:t>
+              <a:t>Let’s do it</a:t>
             </a:r>
             <a:endParaRPr lang="en-US" dirty="0"/>
           </a:p>
@@ -26054,7 +26213,7 @@
           <a:p>
             <a:r>
               <a:rPr lang="en-US" dirty="0" smtClean="0"/>
-              <a:t>Items Panel</a:t>
+              <a:t>Rethink grids</a:t>
             </a:r>
             <a:endParaRPr lang="en-US" dirty="0"/>
           </a:p>
@@ -26062,12 +26221,12 @@
       </p:sp>
       <p:sp>
         <p:nvSpPr>
-          <p:cNvPr id="3" name="Content Placeholder 2"/>
+          <p:cNvPr id="3" name="Text Placeholder 2"/>
           <p:cNvSpPr>
             <a:spLocks noGrp="1"/>
           </p:cNvSpPr>
           <p:nvPr>
-            <p:ph idx="1"/>
+            <p:ph type="body" idx="1"/>
           </p:nvPr>
         </p:nvSpPr>
         <p:spPr/>
@@ -26075,68 +26234,10 @@
           <a:bodyPr/>
           <a:lstStyle/>
           <a:p>
-            <a:r>
-              <a:rPr lang="en-US" dirty="0" smtClean="0"/>
-              <a:t>Sets the panel to use to host the items</a:t>
-            </a:r>
-          </a:p>
-          <a:p>
-            <a:r>
-              <a:rPr lang="en-US" dirty="0" err="1" smtClean="0"/>
-              <a:t>IsItemsHost</a:t>
-            </a:r>
-            <a:endParaRPr lang="en-US" dirty="0" smtClean="0"/>
-          </a:p>
-          <a:p>
-            <a:r>
-              <a:rPr lang="en-US" dirty="0" err="1" smtClean="0"/>
-              <a:t>VirtualizedStackPanel</a:t>
-            </a:r>
-            <a:endParaRPr lang="en-US" dirty="0" smtClean="0"/>
-          </a:p>
-          <a:p>
-            <a:r>
-              <a:rPr lang="en-US" dirty="0" smtClean="0"/>
-              <a:t>Tab Control</a:t>
-            </a:r>
-          </a:p>
-          <a:p>
-            <a:r>
-              <a:rPr lang="en-US" dirty="0" smtClean="0"/>
-              <a:t>Animated </a:t>
-            </a:r>
-            <a:r>
-              <a:rPr lang="en-US" dirty="0" err="1" smtClean="0"/>
-              <a:t>StackPanel</a:t>
-            </a:r>
-            <a:endParaRPr lang="en-US" dirty="0"/>
+            <a:endParaRPr lang="en-US"/>
           </a:p>
         </p:txBody>
       </p:sp>
-      <p:pic>
-        <p:nvPicPr>
-          <p:cNvPr id="4" name="Picture 3" descr="visualstudio.jpg"/>
-          <p:cNvPicPr>
-            <a:picLocks noChangeAspect="1"/>
-          </p:cNvPicPr>
-          <p:nvPr/>
-        </p:nvPicPr>
-        <p:blipFill>
-          <a:blip r:embed="rId2" cstate="print"/>
-          <a:stretch>
-            <a:fillRect/>
-          </a:stretch>
-        </p:blipFill>
-        <p:spPr>
-          <a:xfrm>
-            <a:off x="7839075" y="6076950"/>
-            <a:ext cx="1304925" cy="781050"/>
-          </a:xfrm>
-          <a:prstGeom prst="rect">
-            <a:avLst/>
-          </a:prstGeom>
-        </p:spPr>
-      </p:pic>
     </p:spTree>
   </p:cSld>
   <p:clrMapOvr>
@@ -26179,7 +26280,7 @@
           <a:p>
             <a:r>
               <a:rPr lang="en-US" dirty="0" smtClean="0"/>
-              <a:t>Reference</a:t>
+              <a:t>Grids are inadequate</a:t>
             </a:r>
             <a:endParaRPr lang="en-US" dirty="0"/>
           </a:p>
@@ -26202,44 +26303,87 @@
           <a:p>
             <a:r>
               <a:rPr lang="en-US" dirty="0" smtClean="0"/>
-              <a:t>Ward Bell : Of Tailors and Tooling</a:t>
-            </a:r>
-            <a:endParaRPr lang="en-US" dirty="0" smtClean="0">
-              <a:hlinkClick r:id="rId2"/>
-            </a:endParaRPr>
-          </a:p>
-          <a:p>
-            <a:pPr lvl="1"/>
-            <a:r>
-              <a:rPr lang="en-US" dirty="0" smtClean="0">
-                <a:hlinkClick r:id="rId2"/>
-              </a:rPr>
-              <a:t>http://neverindoubtnet.blogspot.com/2010/03/of-tailors-and-tooling-rant.html</a:t>
-            </a:r>
-            <a:endParaRPr lang="en-US" dirty="0" smtClean="0"/>
+              <a:t>Grids represent data</a:t>
+            </a:r>
           </a:p>
           <a:p>
             <a:r>
               <a:rPr lang="en-US" dirty="0" smtClean="0"/>
-              <a:t>Herding Code : Scott </a:t>
-            </a:r>
-            <a:r>
-              <a:rPr lang="en-US" dirty="0" err="1" smtClean="0"/>
-              <a:t>Bellware</a:t>
-            </a:r>
+              <a:t>But everything isn’t data</a:t>
+            </a:r>
+          </a:p>
+          <a:p>
             <a:r>
               <a:rPr lang="en-US" dirty="0" smtClean="0"/>
-              <a:t> on HTML Specialists</a:t>
-            </a:r>
-          </a:p>
-          <a:p>
-            <a:pPr lvl="1"/>
-            <a:r>
-              <a:rPr lang="en-US" dirty="0" smtClean="0">
-                <a:hlinkClick r:id="rId3"/>
-              </a:rPr>
-              <a:t>http://herdingcode.com/?p=232</a:t>
-            </a:r>
+              <a:t>Destroy some myths</a:t>
+            </a:r>
+            <a:endParaRPr lang="en-US" dirty="0"/>
+          </a:p>
+        </p:txBody>
+      </p:sp>
+    </p:spTree>
+  </p:cSld>
+  <p:clrMapOvr>
+    <a:masterClrMapping/>
+  </p:clrMapOvr>
+</p:sld>
+</file>
+
+<file path=ppt/slides/slide79.xml><?xml version="1.0" encoding="utf-8"?>
+<p:sld xmlns:a="http://schemas.openxmlformats.org/drawingml/2006/main" xmlns:r="http://schemas.openxmlformats.org/officeDocument/2006/relationships" xmlns:p="http://schemas.openxmlformats.org/presentationml/2006/main">
+  <p:cSld>
+    <p:spTree>
+      <p:nvGrpSpPr>
+        <p:cNvPr id="1" name=""/>
+        <p:cNvGrpSpPr/>
+        <p:nvPr/>
+      </p:nvGrpSpPr>
+      <p:grpSpPr>
+        <a:xfrm>
+          <a:off x="0" y="0"/>
+          <a:ext cx="0" cy="0"/>
+          <a:chOff x="0" y="0"/>
+          <a:chExt cx="0" cy="0"/>
+        </a:xfrm>
+      </p:grpSpPr>
+      <p:sp>
+        <p:nvSpPr>
+          <p:cNvPr id="2" name="Title 1"/>
+          <p:cNvSpPr>
+            <a:spLocks noGrp="1"/>
+          </p:cNvSpPr>
+          <p:nvPr>
+            <p:ph type="title"/>
+          </p:nvPr>
+        </p:nvSpPr>
+        <p:spPr/>
+        <p:txBody>
+          <a:bodyPr/>
+          <a:lstStyle/>
+          <a:p>
+            <a:r>
+              <a:rPr lang="en-US" dirty="0" smtClean="0"/>
+              <a:t>All the world is a list</a:t>
+            </a:r>
+            <a:endParaRPr lang="en-US" dirty="0"/>
+          </a:p>
+        </p:txBody>
+      </p:sp>
+      <p:sp>
+        <p:nvSpPr>
+          <p:cNvPr id="3" name="Content Placeholder 2"/>
+          <p:cNvSpPr>
+            <a:spLocks noGrp="1"/>
+          </p:cNvSpPr>
+          <p:nvPr>
+            <p:ph idx="1"/>
+          </p:nvPr>
+        </p:nvSpPr>
+        <p:spPr/>
+        <p:txBody>
+          <a:bodyPr/>
+          <a:lstStyle/>
+          <a:p>
             <a:endParaRPr lang="en-US" dirty="0"/>
           </a:p>
         </p:txBody>
@@ -26308,6 +26452,444 @@
           <a:lstStyle/>
           <a:p>
             <a:endParaRPr lang="en-US"/>
+          </a:p>
+        </p:txBody>
+      </p:sp>
+    </p:spTree>
+  </p:cSld>
+  <p:clrMapOvr>
+    <a:masterClrMapping/>
+  </p:clrMapOvr>
+</p:sld>
+</file>
+
+<file path=ppt/slides/slide80.xml><?xml version="1.0" encoding="utf-8"?>
+<p:sld xmlns:a="http://schemas.openxmlformats.org/drawingml/2006/main" xmlns:r="http://schemas.openxmlformats.org/officeDocument/2006/relationships" xmlns:p="http://schemas.openxmlformats.org/presentationml/2006/main">
+  <p:cSld>
+    <p:spTree>
+      <p:nvGrpSpPr>
+        <p:cNvPr id="1" name=""/>
+        <p:cNvGrpSpPr/>
+        <p:nvPr/>
+      </p:nvGrpSpPr>
+      <p:grpSpPr>
+        <a:xfrm>
+          <a:off x="0" y="0"/>
+          <a:ext cx="0" cy="0"/>
+          <a:chOff x="0" y="0"/>
+          <a:chExt cx="0" cy="0"/>
+        </a:xfrm>
+      </p:grpSpPr>
+      <p:sp>
+        <p:nvSpPr>
+          <p:cNvPr id="2" name="Title 1"/>
+          <p:cNvSpPr>
+            <a:spLocks noGrp="1"/>
+          </p:cNvSpPr>
+          <p:nvPr>
+            <p:ph type="title"/>
+          </p:nvPr>
+        </p:nvSpPr>
+        <p:spPr/>
+        <p:txBody>
+          <a:bodyPr/>
+          <a:lstStyle/>
+          <a:p>
+            <a:r>
+              <a:rPr lang="en-US" dirty="0" smtClean="0"/>
+              <a:t>Data Templates</a:t>
+            </a:r>
+            <a:endParaRPr lang="en-US" dirty="0"/>
+          </a:p>
+        </p:txBody>
+      </p:sp>
+      <p:sp>
+        <p:nvSpPr>
+          <p:cNvPr id="3" name="Content Placeholder 2"/>
+          <p:cNvSpPr>
+            <a:spLocks noGrp="1"/>
+          </p:cNvSpPr>
+          <p:nvPr>
+            <p:ph idx="1"/>
+          </p:nvPr>
+        </p:nvSpPr>
+        <p:spPr/>
+        <p:txBody>
+          <a:bodyPr/>
+          <a:lstStyle/>
+          <a:p>
+            <a:r>
+              <a:rPr lang="en-US" dirty="0" smtClean="0"/>
+              <a:t>Using Keys</a:t>
+            </a:r>
+          </a:p>
+          <a:p>
+            <a:r>
+              <a:rPr lang="en-US" dirty="0" smtClean="0"/>
+              <a:t>Using </a:t>
+            </a:r>
+            <a:r>
+              <a:rPr lang="en-US" dirty="0" err="1" smtClean="0"/>
+              <a:t>DataType</a:t>
+            </a:r>
+            <a:endParaRPr lang="en-US" dirty="0"/>
+          </a:p>
+        </p:txBody>
+      </p:sp>
+      <p:pic>
+        <p:nvPicPr>
+          <p:cNvPr id="4" name="Picture 3" descr="visualstudio.jpg"/>
+          <p:cNvPicPr>
+            <a:picLocks noChangeAspect="1"/>
+          </p:cNvPicPr>
+          <p:nvPr/>
+        </p:nvPicPr>
+        <p:blipFill>
+          <a:blip r:embed="rId2" cstate="print"/>
+          <a:stretch>
+            <a:fillRect/>
+          </a:stretch>
+        </p:blipFill>
+        <p:spPr>
+          <a:xfrm>
+            <a:off x="7839075" y="6076950"/>
+            <a:ext cx="1304925" cy="781050"/>
+          </a:xfrm>
+          <a:prstGeom prst="rect">
+            <a:avLst/>
+          </a:prstGeom>
+        </p:spPr>
+      </p:pic>
+    </p:spTree>
+  </p:cSld>
+  <p:clrMapOvr>
+    <a:masterClrMapping/>
+  </p:clrMapOvr>
+</p:sld>
+</file>
+
+<file path=ppt/slides/slide81.xml><?xml version="1.0" encoding="utf-8"?>
+<p:sld xmlns:a="http://schemas.openxmlformats.org/drawingml/2006/main" xmlns:r="http://schemas.openxmlformats.org/officeDocument/2006/relationships" xmlns:p="http://schemas.openxmlformats.org/presentationml/2006/main">
+  <p:cSld>
+    <p:spTree>
+      <p:nvGrpSpPr>
+        <p:cNvPr id="1" name=""/>
+        <p:cNvGrpSpPr/>
+        <p:nvPr/>
+      </p:nvGrpSpPr>
+      <p:grpSpPr>
+        <a:xfrm>
+          <a:off x="0" y="0"/>
+          <a:ext cx="0" cy="0"/>
+          <a:chOff x="0" y="0"/>
+          <a:chExt cx="0" cy="0"/>
+        </a:xfrm>
+      </p:grpSpPr>
+      <p:sp>
+        <p:nvSpPr>
+          <p:cNvPr id="2" name="Title 1"/>
+          <p:cNvSpPr>
+            <a:spLocks noGrp="1"/>
+          </p:cNvSpPr>
+          <p:nvPr>
+            <p:ph type="title"/>
+          </p:nvPr>
+        </p:nvSpPr>
+        <p:spPr/>
+        <p:txBody>
+          <a:bodyPr/>
+          <a:lstStyle/>
+          <a:p>
+            <a:r>
+              <a:rPr lang="en-US" dirty="0" smtClean="0"/>
+              <a:t>Item Container Style</a:t>
+            </a:r>
+            <a:endParaRPr lang="en-US" dirty="0"/>
+          </a:p>
+        </p:txBody>
+      </p:sp>
+      <p:sp>
+        <p:nvSpPr>
+          <p:cNvPr id="3" name="Content Placeholder 2"/>
+          <p:cNvSpPr>
+            <a:spLocks noGrp="1"/>
+          </p:cNvSpPr>
+          <p:nvPr>
+            <p:ph idx="1"/>
+          </p:nvPr>
+        </p:nvSpPr>
+        <p:spPr/>
+        <p:txBody>
+          <a:bodyPr/>
+          <a:lstStyle/>
+          <a:p>
+            <a:r>
+              <a:rPr lang="en-US" dirty="0" smtClean="0"/>
+              <a:t>Style item</a:t>
+            </a:r>
+          </a:p>
+          <a:p>
+            <a:r>
+              <a:rPr lang="en-US" dirty="0" smtClean="0"/>
+              <a:t>Selected Style</a:t>
+            </a:r>
+            <a:endParaRPr lang="en-US" dirty="0"/>
+          </a:p>
+        </p:txBody>
+      </p:sp>
+      <p:pic>
+        <p:nvPicPr>
+          <p:cNvPr id="4" name="Picture 3" descr="visualstudio.jpg"/>
+          <p:cNvPicPr>
+            <a:picLocks noChangeAspect="1"/>
+          </p:cNvPicPr>
+          <p:nvPr/>
+        </p:nvPicPr>
+        <p:blipFill>
+          <a:blip r:embed="rId2" cstate="print"/>
+          <a:stretch>
+            <a:fillRect/>
+          </a:stretch>
+        </p:blipFill>
+        <p:spPr>
+          <a:xfrm>
+            <a:off x="7839075" y="6076950"/>
+            <a:ext cx="1304925" cy="781050"/>
+          </a:xfrm>
+          <a:prstGeom prst="rect">
+            <a:avLst/>
+          </a:prstGeom>
+        </p:spPr>
+      </p:pic>
+    </p:spTree>
+  </p:cSld>
+  <p:clrMapOvr>
+    <a:masterClrMapping/>
+  </p:clrMapOvr>
+</p:sld>
+</file>
+
+<file path=ppt/slides/slide82.xml><?xml version="1.0" encoding="utf-8"?>
+<p:sld xmlns:a="http://schemas.openxmlformats.org/drawingml/2006/main" xmlns:r="http://schemas.openxmlformats.org/officeDocument/2006/relationships" xmlns:p="http://schemas.openxmlformats.org/presentationml/2006/main">
+  <p:cSld>
+    <p:spTree>
+      <p:nvGrpSpPr>
+        <p:cNvPr id="1" name=""/>
+        <p:cNvGrpSpPr/>
+        <p:nvPr/>
+      </p:nvGrpSpPr>
+      <p:grpSpPr>
+        <a:xfrm>
+          <a:off x="0" y="0"/>
+          <a:ext cx="0" cy="0"/>
+          <a:chOff x="0" y="0"/>
+          <a:chExt cx="0" cy="0"/>
+        </a:xfrm>
+      </p:grpSpPr>
+      <p:sp>
+        <p:nvSpPr>
+          <p:cNvPr id="2" name="Title 1"/>
+          <p:cNvSpPr>
+            <a:spLocks noGrp="1"/>
+          </p:cNvSpPr>
+          <p:nvPr>
+            <p:ph type="title"/>
+          </p:nvPr>
+        </p:nvSpPr>
+        <p:spPr/>
+        <p:txBody>
+          <a:bodyPr/>
+          <a:lstStyle/>
+          <a:p>
+            <a:r>
+              <a:rPr lang="en-US" dirty="0" smtClean="0"/>
+              <a:t>Items Panel</a:t>
+            </a:r>
+            <a:endParaRPr lang="en-US" dirty="0"/>
+          </a:p>
+        </p:txBody>
+      </p:sp>
+      <p:sp>
+        <p:nvSpPr>
+          <p:cNvPr id="3" name="Content Placeholder 2"/>
+          <p:cNvSpPr>
+            <a:spLocks noGrp="1"/>
+          </p:cNvSpPr>
+          <p:nvPr>
+            <p:ph idx="1"/>
+          </p:nvPr>
+        </p:nvSpPr>
+        <p:spPr/>
+        <p:txBody>
+          <a:bodyPr/>
+          <a:lstStyle/>
+          <a:p>
+            <a:r>
+              <a:rPr lang="en-US" dirty="0" smtClean="0"/>
+              <a:t>Sets the panel to use to host the items</a:t>
+            </a:r>
+          </a:p>
+          <a:p>
+            <a:r>
+              <a:rPr lang="en-US" dirty="0" err="1" smtClean="0"/>
+              <a:t>IsItemsHost</a:t>
+            </a:r>
+            <a:endParaRPr lang="en-US" dirty="0" smtClean="0"/>
+          </a:p>
+          <a:p>
+            <a:r>
+              <a:rPr lang="en-US" dirty="0" err="1" smtClean="0"/>
+              <a:t>VirtualizedStackPanel</a:t>
+            </a:r>
+            <a:endParaRPr lang="en-US" dirty="0" smtClean="0"/>
+          </a:p>
+          <a:p>
+            <a:r>
+              <a:rPr lang="en-US" dirty="0" smtClean="0"/>
+              <a:t>Tab Control</a:t>
+            </a:r>
+          </a:p>
+          <a:p>
+            <a:r>
+              <a:rPr lang="en-US" dirty="0" smtClean="0"/>
+              <a:t>Animated </a:t>
+            </a:r>
+            <a:r>
+              <a:rPr lang="en-US" dirty="0" err="1" smtClean="0"/>
+              <a:t>StackPanel</a:t>
+            </a:r>
+            <a:endParaRPr lang="en-US" dirty="0"/>
+          </a:p>
+        </p:txBody>
+      </p:sp>
+      <p:pic>
+        <p:nvPicPr>
+          <p:cNvPr id="4" name="Picture 3" descr="visualstudio.jpg"/>
+          <p:cNvPicPr>
+            <a:picLocks noChangeAspect="1"/>
+          </p:cNvPicPr>
+          <p:nvPr/>
+        </p:nvPicPr>
+        <p:blipFill>
+          <a:blip r:embed="rId2" cstate="print"/>
+          <a:stretch>
+            <a:fillRect/>
+          </a:stretch>
+        </p:blipFill>
+        <p:spPr>
+          <a:xfrm>
+            <a:off x="7839075" y="6076950"/>
+            <a:ext cx="1304925" cy="781050"/>
+          </a:xfrm>
+          <a:prstGeom prst="rect">
+            <a:avLst/>
+          </a:prstGeom>
+        </p:spPr>
+      </p:pic>
+    </p:spTree>
+  </p:cSld>
+  <p:clrMapOvr>
+    <a:masterClrMapping/>
+  </p:clrMapOvr>
+</p:sld>
+</file>
+
+<file path=ppt/slides/slide83.xml><?xml version="1.0" encoding="utf-8"?>
+<p:sld xmlns:a="http://schemas.openxmlformats.org/drawingml/2006/main" xmlns:r="http://schemas.openxmlformats.org/officeDocument/2006/relationships" xmlns:p="http://schemas.openxmlformats.org/presentationml/2006/main">
+  <p:cSld>
+    <p:spTree>
+      <p:nvGrpSpPr>
+        <p:cNvPr id="1" name=""/>
+        <p:cNvGrpSpPr/>
+        <p:nvPr/>
+      </p:nvGrpSpPr>
+      <p:grpSpPr>
+        <a:xfrm>
+          <a:off x="0" y="0"/>
+          <a:ext cx="0" cy="0"/>
+          <a:chOff x="0" y="0"/>
+          <a:chExt cx="0" cy="0"/>
+        </a:xfrm>
+      </p:grpSpPr>
+      <p:sp>
+        <p:nvSpPr>
+          <p:cNvPr id="2" name="Title 1"/>
+          <p:cNvSpPr>
+            <a:spLocks noGrp="1"/>
+          </p:cNvSpPr>
+          <p:nvPr>
+            <p:ph type="title"/>
+          </p:nvPr>
+        </p:nvSpPr>
+        <p:spPr/>
+        <p:txBody>
+          <a:bodyPr/>
+          <a:lstStyle/>
+          <a:p>
+            <a:r>
+              <a:rPr lang="en-US" dirty="0" smtClean="0"/>
+              <a:t>Reference</a:t>
+            </a:r>
+            <a:endParaRPr lang="en-US" dirty="0"/>
+          </a:p>
+        </p:txBody>
+      </p:sp>
+      <p:sp>
+        <p:nvSpPr>
+          <p:cNvPr id="3" name="Content Placeholder 2"/>
+          <p:cNvSpPr>
+            <a:spLocks noGrp="1"/>
+          </p:cNvSpPr>
+          <p:nvPr>
+            <p:ph idx="1"/>
+          </p:nvPr>
+        </p:nvSpPr>
+        <p:spPr/>
+        <p:txBody>
+          <a:bodyPr/>
+          <a:lstStyle/>
+          <a:p>
+            <a:r>
+              <a:rPr lang="en-US" dirty="0" smtClean="0"/>
+              <a:t>Ward Bell : Of Tailors and Tooling</a:t>
+            </a:r>
+            <a:endParaRPr lang="en-US" dirty="0" smtClean="0">
+              <a:hlinkClick r:id="rId2"/>
+            </a:endParaRPr>
+          </a:p>
+          <a:p>
+            <a:pPr lvl="1"/>
+            <a:r>
+              <a:rPr lang="en-US" dirty="0" smtClean="0">
+                <a:hlinkClick r:id="rId2"/>
+              </a:rPr>
+              <a:t>http://neverindoubtnet.blogspot.com/2010/03/of-tailors-and-tooling-rant.html</a:t>
+            </a:r>
+            <a:endParaRPr lang="en-US" dirty="0" smtClean="0"/>
+          </a:p>
+          <a:p>
+            <a:r>
+              <a:rPr lang="en-US" dirty="0" smtClean="0"/>
+              <a:t>Herding Code : Scott </a:t>
+            </a:r>
+            <a:r>
+              <a:rPr lang="en-US" dirty="0" err="1" smtClean="0"/>
+              <a:t>Bellware</a:t>
+            </a:r>
+            <a:r>
+              <a:rPr lang="en-US" dirty="0" smtClean="0"/>
+              <a:t> on HTML Specialists</a:t>
+            </a:r>
+          </a:p>
+          <a:p>
+            <a:pPr lvl="1"/>
+            <a:r>
+              <a:rPr lang="en-US" dirty="0" smtClean="0">
+                <a:hlinkClick r:id="rId3"/>
+              </a:rPr>
+              <a:t>http://herdingcode.com/?p=232</a:t>
+            </a:r>
+            <a:endParaRPr lang="en-US" dirty="0"/>
           </a:p>
         </p:txBody>
       </p:sp>

</xml_diff>